<commit_message>
adding S3 performance optimization
</commit_message>
<xml_diff>
--- a/aws-s3/aws-s3.pptx
+++ b/aws-s3/aws-s3.pptx
@@ -5,7 +5,7 @@
     <p:sldMasterId id="2147483677" r:id="rId1"/>
   </p:sldMasterIdLst>
   <p:notesMasterIdLst>
-    <p:notesMasterId r:id="rId21"/>
+    <p:notesMasterId r:id="rId25"/>
   </p:notesMasterIdLst>
   <p:sldIdLst>
     <p:sldId id="302" r:id="rId2"/>
@@ -25,8 +25,12 @@
     <p:sldId id="296" r:id="rId16"/>
     <p:sldId id="298" r:id="rId17"/>
     <p:sldId id="278" r:id="rId18"/>
-    <p:sldId id="300" r:id="rId19"/>
-    <p:sldId id="283" r:id="rId20"/>
+    <p:sldId id="303" r:id="rId19"/>
+    <p:sldId id="305" r:id="rId20"/>
+    <p:sldId id="306" r:id="rId21"/>
+    <p:sldId id="300" r:id="rId22"/>
+    <p:sldId id="304" r:id="rId23"/>
+    <p:sldId id="283" r:id="rId24"/>
   </p:sldIdLst>
   <p:sldSz cx="9144000" cy="6858000" type="screen4x3"/>
   <p:notesSz cx="6858000" cy="9144000"/>
@@ -210,7 +214,7 @@
           <a:p>
             <a:fld id="{1B6676A5-1300-B945-98B1-DD92DDC3A3CB}" type="datetimeFigureOut">
               <a:rPr lang="en-US" smtClean="0"/>
-              <a:t>4/20/15</a:t>
+              <a:t>4/22/15</a:t>
             </a:fld>
             <a:endParaRPr lang="en-US"/>
           </a:p>
@@ -1385,6 +1389,10 @@
           <a:bodyPr/>
           <a:lstStyle/>
           <a:p>
+            <a:pPr marL="0" indent="0">
+              <a:buFont typeface="Arial"/>
+              <a:buNone/>
+            </a:pPr>
             <a:r>
               <a:rPr lang="en-US" dirty="0" smtClean="0"/>
               <a:t>References:</a:t>
@@ -1397,24 +1405,37 @@
             </a:pPr>
             <a:r>
               <a:rPr lang="en-US" dirty="0" smtClean="0"/>
-              <a:t>https://</a:t>
+              <a:t>http://</a:t>
             </a:r>
             <a:r>
               <a:rPr lang="en-US" dirty="0" err="1" smtClean="0"/>
-              <a:t>aws.amazon.com</a:t>
+              <a:t>docs.aws.amazon.com</a:t>
             </a:r>
             <a:r>
               <a:rPr lang="en-US" dirty="0" smtClean="0"/>
-              <a:t>/blogs/</a:t>
+              <a:t>/AmazonS3/latest/</a:t>
             </a:r>
             <a:r>
               <a:rPr lang="en-US" dirty="0" err="1" smtClean="0"/>
-              <a:t>aws</a:t>
+              <a:t>dev</a:t>
             </a:r>
             <a:r>
               <a:rPr lang="en-US" dirty="0" smtClean="0"/>
-              <a:t>/new-cross-region-replication-for-amazon-s3/</a:t>
-            </a:r>
+              <a:t>/request-rate-</a:t>
+            </a:r>
+            <a:r>
+              <a:rPr lang="en-US" dirty="0" err="1" smtClean="0"/>
+              <a:t>perf</a:t>
+            </a:r>
+            <a:r>
+              <a:rPr lang="en-US" dirty="0" smtClean="0"/>
+              <a:t>-</a:t>
+            </a:r>
+            <a:r>
+              <a:rPr lang="en-US" dirty="0" err="1" smtClean="0"/>
+              <a:t>considerations.html</a:t>
+            </a:r>
+            <a:endParaRPr lang="en-US" dirty="0" smtClean="0"/>
           </a:p>
         </p:txBody>
       </p:sp>
@@ -1498,13 +1519,13 @@
           <a:bodyPr/>
           <a:lstStyle/>
           <a:p>
+            <a:pPr marL="0" indent="0">
+              <a:buFont typeface="Arial"/>
+              <a:buNone/>
+            </a:pPr>
             <a:r>
               <a:rPr lang="en-US" dirty="0" smtClean="0"/>
-              <a:t>Cost of</a:t>
-            </a:r>
-            <a:r>
-              <a:rPr lang="en-US" baseline="0" dirty="0" smtClean="0"/>
-              <a:t> PUTS on AWS higher than Azure:</a:t>
+              <a:t>References:</a:t>
             </a:r>
           </a:p>
           <a:p>
@@ -1514,38 +1535,44 @@
             </a:pPr>
             <a:r>
               <a:rPr lang="en-US" dirty="0" smtClean="0"/>
-              <a:t>PUT</a:t>
-            </a:r>
-            <a:r>
-              <a:rPr lang="en-US" baseline="0" dirty="0" smtClean="0"/>
-              <a:t> is $0.005 on AWS: http://</a:t>
-            </a:r>
-            <a:r>
-              <a:rPr lang="en-US" baseline="0" dirty="0" err="1" smtClean="0"/>
-              <a:t>aws.amazon.com</a:t>
-            </a:r>
-            <a:r>
-              <a:rPr lang="en-US" baseline="0" dirty="0" smtClean="0"/>
-              <a:t>/s3/pricing/</a:t>
-            </a:r>
+              <a:t>http://</a:t>
+            </a:r>
+            <a:r>
+              <a:rPr lang="en-US" dirty="0" err="1" smtClean="0"/>
+              <a:t>docs.aws.amazon.com</a:t>
+            </a:r>
+            <a:r>
+              <a:rPr lang="en-US" dirty="0" smtClean="0"/>
+              <a:t>/AmazonS3/latest/</a:t>
+            </a:r>
+            <a:r>
+              <a:rPr lang="en-US" dirty="0" err="1" smtClean="0"/>
+              <a:t>dev</a:t>
+            </a:r>
+            <a:r>
+              <a:rPr lang="en-US" dirty="0" smtClean="0"/>
+              <a:t>/request-rate-</a:t>
+            </a:r>
+            <a:r>
+              <a:rPr lang="en-US" dirty="0" err="1" smtClean="0"/>
+              <a:t>perf</a:t>
+            </a:r>
+            <a:r>
+              <a:rPr lang="en-US" dirty="0" smtClean="0"/>
+              <a:t>-</a:t>
+            </a:r>
+            <a:r>
+              <a:rPr lang="en-US" dirty="0" err="1" smtClean="0"/>
+              <a:t>considerations.html</a:t>
+            </a:r>
+            <a:endParaRPr lang="en-US" dirty="0" smtClean="0"/>
           </a:p>
           <a:p>
             <a:pPr marL="171450" indent="-171450">
               <a:buFont typeface="Arial"/>
               <a:buChar char="•"/>
             </a:pPr>
-            <a:r>
-              <a:rPr lang="en-US" dirty="0" smtClean="0"/>
-              <a:t>All Transactions are $0.0036 on Azure: http://</a:t>
-            </a:r>
-            <a:r>
-              <a:rPr lang="en-US" dirty="0" err="1" smtClean="0"/>
-              <a:t>azure.microsoft.com</a:t>
-            </a:r>
-            <a:r>
-              <a:rPr lang="en-US" dirty="0" smtClean="0"/>
-              <a:t>/en-us/pricing/details/storage/</a:t>
-            </a:r>
+            <a:endParaRPr lang="en-US" dirty="0" smtClean="0"/>
           </a:p>
         </p:txBody>
       </p:sp>
@@ -1567,6 +1594,143 @@
             <a:fld id="{BFB43062-714D-1146-A97F-0D45BD9E7BF0}" type="slidenum">
               <a:rPr lang="en-US" smtClean="0"/>
               <a:t>19</a:t>
+            </a:fld>
+            <a:endParaRPr lang="en-US"/>
+          </a:p>
+        </p:txBody>
+      </p:sp>
+    </p:spTree>
+    <p:extLst>
+      <p:ext uri="{BB962C8B-B14F-4D97-AF65-F5344CB8AC3E}">
+        <p14:creationId xmlns:p14="http://schemas.microsoft.com/office/powerpoint/2010/main" val="494559740"/>
+      </p:ext>
+    </p:extLst>
+  </p:cSld>
+  <p:clrMapOvr>
+    <a:masterClrMapping/>
+  </p:clrMapOvr>
+</p:notes>
+</file>
+
+<file path=ppt/notesSlides/notesSlide19.xml><?xml version="1.0" encoding="utf-8"?>
+<p:notes xmlns:a="http://schemas.openxmlformats.org/drawingml/2006/main" xmlns:r="http://schemas.openxmlformats.org/officeDocument/2006/relationships" xmlns:p="http://schemas.openxmlformats.org/presentationml/2006/main">
+  <p:cSld>
+    <p:spTree>
+      <p:nvGrpSpPr>
+        <p:cNvPr id="1" name=""/>
+        <p:cNvGrpSpPr/>
+        <p:nvPr/>
+      </p:nvGrpSpPr>
+      <p:grpSpPr>
+        <a:xfrm>
+          <a:off x="0" y="0"/>
+          <a:ext cx="0" cy="0"/>
+          <a:chOff x="0" y="0"/>
+          <a:chExt cx="0" cy="0"/>
+        </a:xfrm>
+      </p:grpSpPr>
+      <p:sp>
+        <p:nvSpPr>
+          <p:cNvPr id="2" name="Slide Image Placeholder 1"/>
+          <p:cNvSpPr>
+            <a:spLocks noGrp="1" noRot="1" noChangeAspect="1"/>
+          </p:cNvSpPr>
+          <p:nvPr>
+            <p:ph type="sldImg"/>
+          </p:nvPr>
+        </p:nvSpPr>
+        <p:spPr/>
+      </p:sp>
+      <p:sp>
+        <p:nvSpPr>
+          <p:cNvPr id="3" name="Notes Placeholder 2"/>
+          <p:cNvSpPr>
+            <a:spLocks noGrp="1"/>
+          </p:cNvSpPr>
+          <p:nvPr>
+            <p:ph type="body" idx="1"/>
+          </p:nvPr>
+        </p:nvSpPr>
+        <p:spPr/>
+        <p:txBody>
+          <a:bodyPr/>
+          <a:lstStyle/>
+          <a:p>
+            <a:pPr marL="0" indent="0">
+              <a:buFont typeface="Arial"/>
+              <a:buNone/>
+            </a:pPr>
+            <a:r>
+              <a:rPr lang="en-US" dirty="0" smtClean="0"/>
+              <a:t>References:</a:t>
+            </a:r>
+          </a:p>
+          <a:p>
+            <a:pPr marL="171450" indent="-171450">
+              <a:buFont typeface="Arial"/>
+              <a:buChar char="•"/>
+            </a:pPr>
+            <a:r>
+              <a:rPr lang="en-US" dirty="0" smtClean="0"/>
+              <a:t>http://</a:t>
+            </a:r>
+            <a:r>
+              <a:rPr lang="en-US" dirty="0" err="1" smtClean="0"/>
+              <a:t>docs.aws.amazon.com</a:t>
+            </a:r>
+            <a:r>
+              <a:rPr lang="en-US" dirty="0" smtClean="0"/>
+              <a:t>/AmazonS3/latest/</a:t>
+            </a:r>
+            <a:r>
+              <a:rPr lang="en-US" dirty="0" err="1" smtClean="0"/>
+              <a:t>dev</a:t>
+            </a:r>
+            <a:r>
+              <a:rPr lang="en-US" dirty="0" smtClean="0"/>
+              <a:t>/request-rate-</a:t>
+            </a:r>
+            <a:r>
+              <a:rPr lang="en-US" dirty="0" err="1" smtClean="0"/>
+              <a:t>perf</a:t>
+            </a:r>
+            <a:r>
+              <a:rPr lang="en-US" dirty="0" smtClean="0"/>
+              <a:t>-</a:t>
+            </a:r>
+            <a:r>
+              <a:rPr lang="en-US" dirty="0" err="1" smtClean="0"/>
+              <a:t>considerations.html</a:t>
+            </a:r>
+            <a:endParaRPr lang="en-US" dirty="0" smtClean="0"/>
+          </a:p>
+          <a:p>
+            <a:pPr marL="171450" indent="-171450">
+              <a:buFont typeface="Arial"/>
+              <a:buChar char="•"/>
+            </a:pPr>
+            <a:endParaRPr lang="en-US" dirty="0" smtClean="0"/>
+          </a:p>
+        </p:txBody>
+      </p:sp>
+      <p:sp>
+        <p:nvSpPr>
+          <p:cNvPr id="4" name="Slide Number Placeholder 3"/>
+          <p:cNvSpPr>
+            <a:spLocks noGrp="1"/>
+          </p:cNvSpPr>
+          <p:nvPr>
+            <p:ph type="sldNum" sz="quarter" idx="10"/>
+          </p:nvPr>
+        </p:nvSpPr>
+        <p:spPr/>
+        <p:txBody>
+          <a:bodyPr/>
+          <a:lstStyle/>
+          <a:p>
+            <a:fld id="{BFB43062-714D-1146-A97F-0D45BD9E7BF0}" type="slidenum">
+              <a:rPr lang="en-US" smtClean="0"/>
+              <a:t>20</a:t>
             </a:fld>
             <a:endParaRPr lang="en-US"/>
           </a:p>
@@ -1706,6 +1870,363 @@
             <a:fld id="{BFB43062-714D-1146-A97F-0D45BD9E7BF0}" type="slidenum">
               <a:rPr lang="en-US" smtClean="0"/>
               <a:t>3</a:t>
+            </a:fld>
+            <a:endParaRPr lang="en-US"/>
+          </a:p>
+        </p:txBody>
+      </p:sp>
+    </p:spTree>
+    <p:extLst>
+      <p:ext uri="{BB962C8B-B14F-4D97-AF65-F5344CB8AC3E}">
+        <p14:creationId xmlns:p14="http://schemas.microsoft.com/office/powerpoint/2010/main" val="494559740"/>
+      </p:ext>
+    </p:extLst>
+  </p:cSld>
+  <p:clrMapOvr>
+    <a:masterClrMapping/>
+  </p:clrMapOvr>
+</p:notes>
+</file>
+
+<file path=ppt/notesSlides/notesSlide20.xml><?xml version="1.0" encoding="utf-8"?>
+<p:notes xmlns:a="http://schemas.openxmlformats.org/drawingml/2006/main" xmlns:r="http://schemas.openxmlformats.org/officeDocument/2006/relationships" xmlns:p="http://schemas.openxmlformats.org/presentationml/2006/main">
+  <p:cSld>
+    <p:spTree>
+      <p:nvGrpSpPr>
+        <p:cNvPr id="1" name=""/>
+        <p:cNvGrpSpPr/>
+        <p:nvPr/>
+      </p:nvGrpSpPr>
+      <p:grpSpPr>
+        <a:xfrm>
+          <a:off x="0" y="0"/>
+          <a:ext cx="0" cy="0"/>
+          <a:chOff x="0" y="0"/>
+          <a:chExt cx="0" cy="0"/>
+        </a:xfrm>
+      </p:grpSpPr>
+      <p:sp>
+        <p:nvSpPr>
+          <p:cNvPr id="2" name="Slide Image Placeholder 1"/>
+          <p:cNvSpPr>
+            <a:spLocks noGrp="1" noRot="1" noChangeAspect="1"/>
+          </p:cNvSpPr>
+          <p:nvPr>
+            <p:ph type="sldImg"/>
+          </p:nvPr>
+        </p:nvSpPr>
+        <p:spPr/>
+      </p:sp>
+      <p:sp>
+        <p:nvSpPr>
+          <p:cNvPr id="3" name="Notes Placeholder 2"/>
+          <p:cNvSpPr>
+            <a:spLocks noGrp="1"/>
+          </p:cNvSpPr>
+          <p:nvPr>
+            <p:ph type="body" idx="1"/>
+          </p:nvPr>
+        </p:nvSpPr>
+        <p:spPr/>
+        <p:txBody>
+          <a:bodyPr/>
+          <a:lstStyle/>
+          <a:p>
+            <a:r>
+              <a:rPr lang="en-US" dirty="0" smtClean="0"/>
+              <a:t>References:</a:t>
+            </a:r>
+          </a:p>
+          <a:p>
+            <a:pPr marL="171450" indent="-171450">
+              <a:buFont typeface="Arial"/>
+              <a:buChar char="•"/>
+            </a:pPr>
+            <a:r>
+              <a:rPr lang="en-US" dirty="0" smtClean="0"/>
+              <a:t>https://</a:t>
+            </a:r>
+            <a:r>
+              <a:rPr lang="en-US" dirty="0" err="1" smtClean="0"/>
+              <a:t>aws.amazon.com</a:t>
+            </a:r>
+            <a:r>
+              <a:rPr lang="en-US" dirty="0" smtClean="0"/>
+              <a:t>/blogs/</a:t>
+            </a:r>
+            <a:r>
+              <a:rPr lang="en-US" dirty="0" err="1" smtClean="0"/>
+              <a:t>aws</a:t>
+            </a:r>
+            <a:r>
+              <a:rPr lang="en-US" dirty="0" smtClean="0"/>
+              <a:t>/new-cross-region-replication-for-amazon-s3/</a:t>
+            </a:r>
+          </a:p>
+        </p:txBody>
+      </p:sp>
+      <p:sp>
+        <p:nvSpPr>
+          <p:cNvPr id="4" name="Slide Number Placeholder 3"/>
+          <p:cNvSpPr>
+            <a:spLocks noGrp="1"/>
+          </p:cNvSpPr>
+          <p:nvPr>
+            <p:ph type="sldNum" sz="quarter" idx="10"/>
+          </p:nvPr>
+        </p:nvSpPr>
+        <p:spPr/>
+        <p:txBody>
+          <a:bodyPr/>
+          <a:lstStyle/>
+          <a:p>
+            <a:fld id="{BFB43062-714D-1146-A97F-0D45BD9E7BF0}" type="slidenum">
+              <a:rPr lang="en-US" smtClean="0"/>
+              <a:t>21</a:t>
+            </a:fld>
+            <a:endParaRPr lang="en-US"/>
+          </a:p>
+        </p:txBody>
+      </p:sp>
+    </p:spTree>
+    <p:extLst>
+      <p:ext uri="{BB962C8B-B14F-4D97-AF65-F5344CB8AC3E}">
+        <p14:creationId xmlns:p14="http://schemas.microsoft.com/office/powerpoint/2010/main" val="494559740"/>
+      </p:ext>
+    </p:extLst>
+  </p:cSld>
+  <p:clrMapOvr>
+    <a:masterClrMapping/>
+  </p:clrMapOvr>
+</p:notes>
+</file>
+
+<file path=ppt/notesSlides/notesSlide21.xml><?xml version="1.0" encoding="utf-8"?>
+<p:notes xmlns:a="http://schemas.openxmlformats.org/drawingml/2006/main" xmlns:r="http://schemas.openxmlformats.org/officeDocument/2006/relationships" xmlns:p="http://schemas.openxmlformats.org/presentationml/2006/main">
+  <p:cSld>
+    <p:spTree>
+      <p:nvGrpSpPr>
+        <p:cNvPr id="1" name=""/>
+        <p:cNvGrpSpPr/>
+        <p:nvPr/>
+      </p:nvGrpSpPr>
+      <p:grpSpPr>
+        <a:xfrm>
+          <a:off x="0" y="0"/>
+          <a:ext cx="0" cy="0"/>
+          <a:chOff x="0" y="0"/>
+          <a:chExt cx="0" cy="0"/>
+        </a:xfrm>
+      </p:grpSpPr>
+      <p:sp>
+        <p:nvSpPr>
+          <p:cNvPr id="2" name="Slide Image Placeholder 1"/>
+          <p:cNvSpPr>
+            <a:spLocks noGrp="1" noRot="1" noChangeAspect="1"/>
+          </p:cNvSpPr>
+          <p:nvPr>
+            <p:ph type="sldImg"/>
+          </p:nvPr>
+        </p:nvSpPr>
+        <p:spPr/>
+      </p:sp>
+      <p:sp>
+        <p:nvSpPr>
+          <p:cNvPr id="3" name="Notes Placeholder 2"/>
+          <p:cNvSpPr>
+            <a:spLocks noGrp="1"/>
+          </p:cNvSpPr>
+          <p:nvPr>
+            <p:ph type="body" idx="1"/>
+          </p:nvPr>
+        </p:nvSpPr>
+        <p:spPr/>
+        <p:txBody>
+          <a:bodyPr/>
+          <a:lstStyle/>
+          <a:p>
+            <a:r>
+              <a:rPr lang="en-US" dirty="0" smtClean="0"/>
+              <a:t>References:</a:t>
+            </a:r>
+          </a:p>
+          <a:p>
+            <a:pPr marL="171450" indent="-171450">
+              <a:buFont typeface="Arial"/>
+              <a:buChar char="•"/>
+            </a:pPr>
+            <a:r>
+              <a:rPr lang="en-US" dirty="0" smtClean="0"/>
+              <a:t>https://</a:t>
+            </a:r>
+            <a:r>
+              <a:rPr lang="en-US" dirty="0" err="1" smtClean="0"/>
+              <a:t>aws.amazon.com</a:t>
+            </a:r>
+            <a:r>
+              <a:rPr lang="en-US" dirty="0" smtClean="0"/>
+              <a:t>/blogs/</a:t>
+            </a:r>
+            <a:r>
+              <a:rPr lang="en-US" dirty="0" err="1" smtClean="0"/>
+              <a:t>aws</a:t>
+            </a:r>
+            <a:r>
+              <a:rPr lang="en-US" dirty="0" smtClean="0"/>
+              <a:t>/new-cross-region-replication-for-amazon-s3/</a:t>
+            </a:r>
+          </a:p>
+        </p:txBody>
+      </p:sp>
+      <p:sp>
+        <p:nvSpPr>
+          <p:cNvPr id="4" name="Slide Number Placeholder 3"/>
+          <p:cNvSpPr>
+            <a:spLocks noGrp="1"/>
+          </p:cNvSpPr>
+          <p:nvPr>
+            <p:ph type="sldNum" sz="quarter" idx="10"/>
+          </p:nvPr>
+        </p:nvSpPr>
+        <p:spPr/>
+        <p:txBody>
+          <a:bodyPr/>
+          <a:lstStyle/>
+          <a:p>
+            <a:fld id="{BFB43062-714D-1146-A97F-0D45BD9E7BF0}" type="slidenum">
+              <a:rPr lang="en-US" smtClean="0"/>
+              <a:t>22</a:t>
+            </a:fld>
+            <a:endParaRPr lang="en-US"/>
+          </a:p>
+        </p:txBody>
+      </p:sp>
+    </p:spTree>
+    <p:extLst>
+      <p:ext uri="{BB962C8B-B14F-4D97-AF65-F5344CB8AC3E}">
+        <p14:creationId xmlns:p14="http://schemas.microsoft.com/office/powerpoint/2010/main" val="494559740"/>
+      </p:ext>
+    </p:extLst>
+  </p:cSld>
+  <p:clrMapOvr>
+    <a:masterClrMapping/>
+  </p:clrMapOvr>
+</p:notes>
+</file>
+
+<file path=ppt/notesSlides/notesSlide22.xml><?xml version="1.0" encoding="utf-8"?>
+<p:notes xmlns:a="http://schemas.openxmlformats.org/drawingml/2006/main" xmlns:r="http://schemas.openxmlformats.org/officeDocument/2006/relationships" xmlns:p="http://schemas.openxmlformats.org/presentationml/2006/main">
+  <p:cSld>
+    <p:spTree>
+      <p:nvGrpSpPr>
+        <p:cNvPr id="1" name=""/>
+        <p:cNvGrpSpPr/>
+        <p:nvPr/>
+      </p:nvGrpSpPr>
+      <p:grpSpPr>
+        <a:xfrm>
+          <a:off x="0" y="0"/>
+          <a:ext cx="0" cy="0"/>
+          <a:chOff x="0" y="0"/>
+          <a:chExt cx="0" cy="0"/>
+        </a:xfrm>
+      </p:grpSpPr>
+      <p:sp>
+        <p:nvSpPr>
+          <p:cNvPr id="2" name="Slide Image Placeholder 1"/>
+          <p:cNvSpPr>
+            <a:spLocks noGrp="1" noRot="1" noChangeAspect="1"/>
+          </p:cNvSpPr>
+          <p:nvPr>
+            <p:ph type="sldImg"/>
+          </p:nvPr>
+        </p:nvSpPr>
+        <p:spPr/>
+      </p:sp>
+      <p:sp>
+        <p:nvSpPr>
+          <p:cNvPr id="3" name="Notes Placeholder 2"/>
+          <p:cNvSpPr>
+            <a:spLocks noGrp="1"/>
+          </p:cNvSpPr>
+          <p:nvPr>
+            <p:ph type="body" idx="1"/>
+          </p:nvPr>
+        </p:nvSpPr>
+        <p:spPr/>
+        <p:txBody>
+          <a:bodyPr/>
+          <a:lstStyle/>
+          <a:p>
+            <a:r>
+              <a:rPr lang="en-US" dirty="0" smtClean="0"/>
+              <a:t>Cost of</a:t>
+            </a:r>
+            <a:r>
+              <a:rPr lang="en-US" baseline="0" dirty="0" smtClean="0"/>
+              <a:t> PUTS on AWS higher than Azure:</a:t>
+            </a:r>
+          </a:p>
+          <a:p>
+            <a:pPr marL="171450" indent="-171450">
+              <a:buFont typeface="Arial"/>
+              <a:buChar char="•"/>
+            </a:pPr>
+            <a:r>
+              <a:rPr lang="en-US" dirty="0" smtClean="0"/>
+              <a:t>PUT</a:t>
+            </a:r>
+            <a:r>
+              <a:rPr lang="en-US" baseline="0" dirty="0" smtClean="0"/>
+              <a:t> is $0.005 on AWS: http://</a:t>
+            </a:r>
+            <a:r>
+              <a:rPr lang="en-US" baseline="0" dirty="0" err="1" smtClean="0"/>
+              <a:t>aws.amazon.com</a:t>
+            </a:r>
+            <a:r>
+              <a:rPr lang="en-US" baseline="0" dirty="0" smtClean="0"/>
+              <a:t>/s3/pricing/</a:t>
+            </a:r>
+          </a:p>
+          <a:p>
+            <a:pPr marL="171450" indent="-171450">
+              <a:buFont typeface="Arial"/>
+              <a:buChar char="•"/>
+            </a:pPr>
+            <a:r>
+              <a:rPr lang="en-US" dirty="0" smtClean="0"/>
+              <a:t>All Transactions are $0.0036 on Azure: http://</a:t>
+            </a:r>
+            <a:r>
+              <a:rPr lang="en-US" dirty="0" err="1" smtClean="0"/>
+              <a:t>azure.microsoft.com</a:t>
+            </a:r>
+            <a:r>
+              <a:rPr lang="en-US" dirty="0" smtClean="0"/>
+              <a:t>/en-us/pricing/details/storage/</a:t>
+            </a:r>
+          </a:p>
+        </p:txBody>
+      </p:sp>
+      <p:sp>
+        <p:nvSpPr>
+          <p:cNvPr id="4" name="Slide Number Placeholder 3"/>
+          <p:cNvSpPr>
+            <a:spLocks noGrp="1"/>
+          </p:cNvSpPr>
+          <p:nvPr>
+            <p:ph type="sldNum" sz="quarter" idx="10"/>
+          </p:nvPr>
+        </p:nvSpPr>
+        <p:spPr/>
+        <p:txBody>
+          <a:bodyPr/>
+          <a:lstStyle/>
+          <a:p>
+            <a:fld id="{BFB43062-714D-1146-A97F-0D45BD9E7BF0}" type="slidenum">
+              <a:rPr lang="en-US" smtClean="0"/>
+              <a:t>23</a:t>
             </a:fld>
             <a:endParaRPr lang="en-US"/>
           </a:p>
@@ -4366,7 +4887,7 @@
           <a:p>
             <a:fld id="{7CE38E4D-051A-41E1-86A4-E56916468FD0}" type="datetimeFigureOut">
               <a:rPr lang="en-US" smtClean="0"/>
-              <a:t>4/20/15</a:t>
+              <a:t>4/22/15</a:t>
             </a:fld>
             <a:endParaRPr lang="en-US"/>
           </a:p>
@@ -4547,7 +5068,7 @@
           <a:p>
             <a:fld id="{7CE38E4D-051A-41E1-86A4-E56916468FD0}" type="datetimeFigureOut">
               <a:rPr lang="en-US" smtClean="0"/>
-              <a:t>4/20/15</a:t>
+              <a:t>4/22/15</a:t>
             </a:fld>
             <a:endParaRPr lang="en-US"/>
           </a:p>
@@ -4698,7 +5219,7 @@
           <a:p>
             <a:fld id="{7CE38E4D-051A-41E1-86A4-E56916468FD0}" type="datetimeFigureOut">
               <a:rPr lang="en-US" smtClean="0"/>
-              <a:t>4/20/15</a:t>
+              <a:t>4/22/15</a:t>
             </a:fld>
             <a:endParaRPr lang="en-US"/>
           </a:p>
@@ -6524,7 +7045,7 @@
           <a:p>
             <a:fld id="{7CE38E4D-051A-41E1-86A4-E56916468FD0}" type="datetimeFigureOut">
               <a:rPr lang="en-US" smtClean="0"/>
-              <a:t>4/20/15</a:t>
+              <a:t>4/22/15</a:t>
             </a:fld>
             <a:endParaRPr lang="en-US"/>
           </a:p>
@@ -8394,7 +8915,7 @@
           <a:p>
             <a:fld id="{7CE38E4D-051A-41E1-86A4-E56916468FD0}" type="datetimeFigureOut">
               <a:rPr lang="en-US" smtClean="0"/>
-              <a:t>4/20/15</a:t>
+              <a:t>4/22/15</a:t>
             </a:fld>
             <a:endParaRPr lang="en-US"/>
           </a:p>
@@ -8507,7 +9028,7 @@
           <a:p>
             <a:fld id="{7CE38E4D-051A-41E1-86A4-E56916468FD0}" type="datetimeFigureOut">
               <a:rPr lang="en-US" smtClean="0"/>
-              <a:t>4/20/15</a:t>
+              <a:t>4/22/15</a:t>
             </a:fld>
             <a:endParaRPr lang="en-US"/>
           </a:p>
@@ -9048,7 +9569,7 @@
           <a:p>
             <a:fld id="{7CE38E4D-051A-41E1-86A4-E56916468FD0}" type="datetimeFigureOut">
               <a:rPr lang="en-US" smtClean="0"/>
-              <a:t>4/20/15</a:t>
+              <a:t>4/22/15</a:t>
             </a:fld>
             <a:endParaRPr lang="en-US"/>
           </a:p>
@@ -9161,7 +9682,7 @@
           <a:p>
             <a:fld id="{7CE38E4D-051A-41E1-86A4-E56916468FD0}" type="datetimeFigureOut">
               <a:rPr lang="en-US" smtClean="0"/>
-              <a:t>4/20/15</a:t>
+              <a:t>4/22/15</a:t>
             </a:fld>
             <a:endParaRPr lang="en-US"/>
           </a:p>
@@ -10872,7 +11393,7 @@
           <a:p>
             <a:fld id="{7CE38E4D-051A-41E1-86A4-E56916468FD0}" type="datetimeFigureOut">
               <a:rPr lang="en-US" smtClean="0"/>
-              <a:t>4/20/15</a:t>
+              <a:t>4/22/15</a:t>
             </a:fld>
             <a:endParaRPr lang="en-US"/>
           </a:p>
@@ -11023,7 +11544,7 @@
           <a:p>
             <a:fld id="{7CE38E4D-051A-41E1-86A4-E56916468FD0}" type="datetimeFigureOut">
               <a:rPr lang="en-US" smtClean="0"/>
-              <a:t>4/20/15</a:t>
+              <a:t>4/22/15</a:t>
             </a:fld>
             <a:endParaRPr lang="en-US"/>
           </a:p>
@@ -14638,7 +15159,7 @@
           <a:p>
             <a:fld id="{7CE38E4D-051A-41E1-86A4-E56916468FD0}" type="datetimeFigureOut">
               <a:rPr lang="en-US" smtClean="0"/>
-              <a:t>4/20/15</a:t>
+              <a:t>4/22/15</a:t>
             </a:fld>
             <a:endParaRPr lang="en-US"/>
           </a:p>
@@ -16497,7 +17018,7 @@
           <a:p>
             <a:fld id="{7CE38E4D-051A-41E1-86A4-E56916468FD0}" type="datetimeFigureOut">
               <a:rPr lang="en-US" smtClean="0"/>
-              <a:t>4/20/15</a:t>
+              <a:t>4/22/15</a:t>
             </a:fld>
             <a:endParaRPr lang="en-US"/>
           </a:p>
@@ -17032,11 +17553,7 @@
           <a:p>
             <a:r>
               <a:rPr lang="en-US" smtClean="0"/>
-              <a:t>AWS </a:t>
-            </a:r>
-            <a:r>
-              <a:rPr lang="en-US" smtClean="0"/>
-              <a:t>S3</a:t>
+              <a:t>AWS S3</a:t>
             </a:r>
             <a:endParaRPr lang="en-US" sz="2400" dirty="0"/>
           </a:p>
@@ -18161,40 +18678,166 @@
         <p:spPr/>
         <p:txBody>
           <a:bodyPr>
-            <a:normAutofit/>
+            <a:normAutofit fontScale="92500" lnSpcReduction="10000"/>
           </a:bodyPr>
           <a:lstStyle/>
           <a:p>
             <a:r>
-              <a:rPr lang="en-US" dirty="0" smtClean="0"/>
-              <a:t>Have Instructions for Configuration</a:t>
-            </a:r>
-          </a:p>
-          <a:p>
-            <a:r>
-              <a:rPr lang="en-US" dirty="0" smtClean="0"/>
-              <a:t>Released on March 24, 2015</a:t>
-            </a:r>
-          </a:p>
-          <a:p>
-            <a:r>
-              <a:rPr lang="en-US" dirty="0" smtClean="0"/>
-              <a:t>Use Cross Region Replication to Automatically push Objects from one Region to Another</a:t>
-            </a:r>
-          </a:p>
-          <a:p>
-            <a:r>
-              <a:rPr lang="en-US" dirty="0" smtClean="0"/>
-              <a:t>Replication includes object ACLs, metadata</a:t>
-            </a:r>
-            <a:r>
-              <a:rPr lang="en-US" dirty="0"/>
+              <a:rPr lang="en-US" dirty="0" smtClean="0">
+                <a:solidFill>
+                  <a:schemeClr val="accent5"/>
+                </a:solidFill>
+              </a:rPr>
+              <a:t>Disclaimer: I have not yet verified the suggested S3 performance optimization through testing. </a:t>
+            </a:r>
+          </a:p>
+          <a:p>
+            <a:r>
+              <a:rPr lang="en-US" dirty="0" smtClean="0">
+                <a:solidFill>
+                  <a:schemeClr val="tx1"/>
+                </a:solidFill>
+              </a:rPr>
+              <a:t>Key selection can improve the retrieval rate of objects from S3</a:t>
+            </a:r>
+          </a:p>
+          <a:p>
+            <a:r>
+              <a:rPr lang="en-US" dirty="0" smtClean="0">
+                <a:solidFill>
+                  <a:schemeClr val="tx1"/>
+                </a:solidFill>
+              </a:rPr>
+              <a:t>In particular, if </a:t>
+            </a:r>
+            <a:r>
+              <a:rPr lang="en-US" dirty="0">
+                <a:solidFill>
+                  <a:schemeClr val="tx1"/>
+                </a:solidFill>
+              </a:rPr>
+              <a:t>you require performance of S3 that </a:t>
+            </a:r>
+            <a:r>
+              <a:rPr lang="en-US" dirty="0" smtClean="0">
+                <a:solidFill>
+                  <a:schemeClr val="tx1"/>
+                </a:solidFill>
+              </a:rPr>
+              <a:t>exceeds</a:t>
+            </a:r>
+            <a:r>
+              <a:rPr lang="en-US" dirty="0">
+                <a:solidFill>
+                  <a:schemeClr val="tx1"/>
+                </a:solidFill>
+              </a:rPr>
               <a:t> </a:t>
             </a:r>
             <a:r>
-              <a:rPr lang="en-US" dirty="0" smtClean="0"/>
-              <a:t>and Reduced Redundancy Storage setting</a:t>
-            </a:r>
+              <a:rPr lang="en-US" dirty="0" smtClean="0">
+                <a:solidFill>
+                  <a:schemeClr val="tx1"/>
+                </a:solidFill>
+              </a:rPr>
+              <a:t>the following:</a:t>
+            </a:r>
+            <a:endParaRPr lang="en-US" dirty="0">
+              <a:solidFill>
+                <a:schemeClr val="tx1"/>
+              </a:solidFill>
+            </a:endParaRPr>
+          </a:p>
+          <a:p>
+            <a:pPr lvl="1"/>
+            <a:r>
+              <a:rPr lang="en-US" dirty="0" smtClean="0">
+                <a:solidFill>
+                  <a:schemeClr val="tx1"/>
+                </a:solidFill>
+              </a:rPr>
+              <a:t>Routine workload 100 </a:t>
+            </a:r>
+            <a:r>
+              <a:rPr lang="en-US" dirty="0">
+                <a:solidFill>
+                  <a:schemeClr val="tx1"/>
+                </a:solidFill>
+              </a:rPr>
+              <a:t>PUT/LIST/</a:t>
+            </a:r>
+            <a:r>
+              <a:rPr lang="en-US" dirty="0" smtClean="0">
+                <a:solidFill>
+                  <a:schemeClr val="tx1"/>
+                </a:solidFill>
+              </a:rPr>
+              <a:t>DELETE/”list object” </a:t>
+            </a:r>
+            <a:r>
+              <a:rPr lang="en-US" dirty="0">
+                <a:solidFill>
+                  <a:schemeClr val="tx1"/>
+                </a:solidFill>
+              </a:rPr>
+              <a:t>requests per </a:t>
+            </a:r>
+            <a:r>
+              <a:rPr lang="en-US" dirty="0" smtClean="0">
+                <a:solidFill>
+                  <a:schemeClr val="tx1"/>
+                </a:solidFill>
+              </a:rPr>
+              <a:t>second</a:t>
+            </a:r>
+          </a:p>
+          <a:p>
+            <a:pPr lvl="1"/>
+            <a:r>
+              <a:rPr lang="en-US" dirty="0" smtClean="0">
+                <a:solidFill>
+                  <a:schemeClr val="tx1"/>
+                </a:solidFill>
+              </a:rPr>
+              <a:t>Routine workload of 300 </a:t>
+            </a:r>
+            <a:r>
+              <a:rPr lang="en-US" dirty="0">
+                <a:solidFill>
+                  <a:schemeClr val="tx1"/>
+                </a:solidFill>
+              </a:rPr>
+              <a:t>GET requests per </a:t>
+            </a:r>
+            <a:r>
+              <a:rPr lang="en-US" dirty="0" smtClean="0">
+                <a:solidFill>
+                  <a:schemeClr val="tx1"/>
+                </a:solidFill>
+              </a:rPr>
+              <a:t>second</a:t>
+            </a:r>
+          </a:p>
+          <a:p>
+            <a:pPr lvl="1"/>
+            <a:r>
+              <a:rPr lang="en-US" dirty="0" smtClean="0">
+                <a:solidFill>
+                  <a:schemeClr val="tx1"/>
+                </a:solidFill>
+              </a:rPr>
+              <a:t>Large number of GETS</a:t>
+            </a:r>
+          </a:p>
+          <a:p>
+            <a:pPr marL="0" indent="0">
+              <a:buNone/>
+            </a:pPr>
+            <a:endParaRPr lang="en-US" dirty="0" smtClean="0">
+              <a:solidFill>
+                <a:schemeClr val="tx1"/>
+              </a:solidFill>
+            </a:endParaRPr>
           </a:p>
         </p:txBody>
       </p:sp>
@@ -18210,49 +18853,21 @@
         </p:nvSpPr>
         <p:spPr/>
         <p:txBody>
-          <a:bodyPr>
-            <a:normAutofit fontScale="90000"/>
-          </a:bodyPr>
+          <a:bodyPr/>
           <a:lstStyle/>
           <a:p>
             <a:r>
               <a:rPr lang="en-US" dirty="0" smtClean="0"/>
-              <a:t>Hands On: S3 Cross Region Replication</a:t>
+              <a:t>S3: Performance Optimization I</a:t>
             </a:r>
             <a:endParaRPr lang="en-US" dirty="0"/>
-          </a:p>
-        </p:txBody>
-      </p:sp>
-      <p:sp>
-        <p:nvSpPr>
-          <p:cNvPr id="4" name="TextBox 3"/>
-          <p:cNvSpPr txBox="1"/>
-          <p:nvPr/>
-        </p:nvSpPr>
-        <p:spPr>
-          <a:xfrm>
-            <a:off x="10678781" y="4679784"/>
-            <a:ext cx="184666" cy="369332"/>
-          </a:xfrm>
-          <a:prstGeom prst="rect">
-            <a:avLst/>
-          </a:prstGeom>
-          <a:noFill/>
-        </p:spPr>
-        <p:txBody>
-          <a:bodyPr wrap="none" rtlCol="0">
-            <a:spAutoFit/>
-          </a:bodyPr>
-          <a:lstStyle/>
-          <a:p>
-            <a:endParaRPr lang="en-US"/>
           </a:p>
         </p:txBody>
       </p:sp>
     </p:spTree>
     <p:extLst>
       <p:ext uri="{BB962C8B-B14F-4D97-AF65-F5344CB8AC3E}">
-        <p14:creationId xmlns:p14="http://schemas.microsoft.com/office/powerpoint/2010/main" val="3642192089"/>
+        <p14:creationId xmlns:p14="http://schemas.microsoft.com/office/powerpoint/2010/main" val="4231770518"/>
       </p:ext>
     </p:extLst>
   </p:cSld>
@@ -18299,31 +18914,148 @@
         <p:spPr/>
         <p:txBody>
           <a:bodyPr>
-            <a:normAutofit/>
+            <a:normAutofit lnSpcReduction="10000"/>
           </a:bodyPr>
           <a:lstStyle/>
           <a:p>
             <a:r>
-              <a:rPr lang="en-US" dirty="0" smtClean="0"/>
-              <a:t>Storage of all user and auto photos for a Ride Sharing network</a:t>
-            </a:r>
-          </a:p>
-          <a:p>
-            <a:r>
-              <a:rPr lang="en-US" dirty="0" smtClean="0"/>
-              <a:t>Origin for a CDN used by all company websites</a:t>
-            </a:r>
-          </a:p>
-          <a:p>
-            <a:r>
-              <a:rPr lang="en-US" dirty="0" smtClean="0"/>
-              <a:t>Archival Storage and Backup</a:t>
-            </a:r>
-          </a:p>
-          <a:p>
-            <a:r>
-              <a:rPr lang="en-US" dirty="0" smtClean="0"/>
-              <a:t>Performed analysis where Azure was less expensive due to cost of “PUTS” on AWS being higher than Azure</a:t>
+              <a:rPr lang="en-US" dirty="0" smtClean="0">
+                <a:solidFill>
+                  <a:schemeClr val="tx1"/>
+                </a:solidFill>
+              </a:rPr>
+              <a:t>The problem:</a:t>
+            </a:r>
+          </a:p>
+          <a:p>
+            <a:pPr lvl="1"/>
+            <a:r>
+              <a:rPr lang="en-US" dirty="0" smtClean="0">
+                <a:solidFill>
+                  <a:schemeClr val="tx1"/>
+                </a:solidFill>
+              </a:rPr>
+              <a:t>Object </a:t>
+            </a:r>
+            <a:r>
+              <a:rPr lang="en-US" dirty="0">
+                <a:solidFill>
+                  <a:schemeClr val="tx1"/>
+                </a:solidFill>
+              </a:rPr>
+              <a:t>keys are </a:t>
+            </a:r>
+            <a:r>
+              <a:rPr lang="en-US" dirty="0" smtClean="0">
+                <a:solidFill>
+                  <a:schemeClr val="tx1"/>
+                </a:solidFill>
+              </a:rPr>
+              <a:t>stored in S3 alphabetically</a:t>
+            </a:r>
+          </a:p>
+          <a:p>
+            <a:pPr lvl="1"/>
+            <a:r>
+              <a:rPr lang="en-US" dirty="0" smtClean="0">
+                <a:solidFill>
+                  <a:schemeClr val="tx1"/>
+                </a:solidFill>
+              </a:rPr>
+              <a:t>Object keys dictates </a:t>
+            </a:r>
+            <a:r>
+              <a:rPr lang="en-US" dirty="0">
+                <a:solidFill>
+                  <a:schemeClr val="tx1"/>
+                </a:solidFill>
+              </a:rPr>
+              <a:t>which partition the objects are stored </a:t>
+            </a:r>
+            <a:r>
+              <a:rPr lang="en-US" dirty="0" smtClean="0">
+                <a:solidFill>
+                  <a:schemeClr val="tx1"/>
+                </a:solidFill>
+              </a:rPr>
+              <a:t>in</a:t>
+            </a:r>
+          </a:p>
+          <a:p>
+            <a:pPr lvl="1"/>
+            <a:r>
+              <a:rPr lang="en-US" dirty="0" smtClean="0">
+                <a:solidFill>
+                  <a:schemeClr val="tx1"/>
+                </a:solidFill>
+              </a:rPr>
+              <a:t>if object key are </a:t>
+            </a:r>
+            <a:r>
+              <a:rPr lang="en-US" dirty="0">
+                <a:solidFill>
+                  <a:schemeClr val="tx1"/>
+                </a:solidFill>
+              </a:rPr>
+              <a:t>sequential, it increases the likelihood that the data is stored in the same </a:t>
+            </a:r>
+            <a:r>
+              <a:rPr lang="en-US" dirty="0" smtClean="0">
+                <a:solidFill>
+                  <a:schemeClr val="tx1"/>
+                </a:solidFill>
+              </a:rPr>
+              <a:t>partition</a:t>
+            </a:r>
+            <a:endParaRPr lang="en-US" dirty="0">
+              <a:solidFill>
+                <a:schemeClr val="tx1"/>
+              </a:solidFill>
+            </a:endParaRPr>
+          </a:p>
+          <a:p>
+            <a:r>
+              <a:rPr lang="en-US" dirty="0" smtClean="0">
+                <a:solidFill>
+                  <a:schemeClr val="tx1"/>
+                </a:solidFill>
+              </a:rPr>
+              <a:t>The solution:</a:t>
+            </a:r>
+          </a:p>
+          <a:p>
+            <a:pPr lvl="1"/>
+            <a:r>
+              <a:rPr lang="en-US" dirty="0">
+                <a:solidFill>
+                  <a:schemeClr val="tx1"/>
+                </a:solidFill>
+              </a:rPr>
+              <a:t>use a </a:t>
+            </a:r>
+            <a:r>
+              <a:rPr lang="en-US" dirty="0" smtClean="0">
+                <a:solidFill>
+                  <a:schemeClr val="tx1"/>
+                </a:solidFill>
+              </a:rPr>
+              <a:t>hexadecimal hash prefix </a:t>
+            </a:r>
+            <a:r>
+              <a:rPr lang="en-US" dirty="0">
+                <a:solidFill>
+                  <a:schemeClr val="tx1"/>
+                </a:solidFill>
+              </a:rPr>
+              <a:t>of 3 to 4 </a:t>
+            </a:r>
+            <a:r>
+              <a:rPr lang="en-US" dirty="0" smtClean="0">
+                <a:solidFill>
+                  <a:schemeClr val="tx1"/>
+                </a:solidFill>
+              </a:rPr>
+              <a:t>characters to spread requests across multiple partitions</a:t>
             </a:r>
           </a:p>
         </p:txBody>
@@ -18345,7 +19077,7 @@
           <a:p>
             <a:r>
               <a:rPr lang="en-US" dirty="0" smtClean="0"/>
-              <a:t>S3: Practical Experience</a:t>
+              <a:t>S3: Performance Optimization II</a:t>
             </a:r>
             <a:endParaRPr lang="en-US" dirty="0"/>
           </a:p>
@@ -18354,7 +19086,7 @@
     </p:spTree>
     <p:extLst>
       <p:ext uri="{BB962C8B-B14F-4D97-AF65-F5344CB8AC3E}">
-        <p14:creationId xmlns:p14="http://schemas.microsoft.com/office/powerpoint/2010/main" val="2648952938"/>
+        <p14:creationId xmlns:p14="http://schemas.microsoft.com/office/powerpoint/2010/main" val="1499926983"/>
       </p:ext>
     </p:extLst>
   </p:cSld>
@@ -18472,6 +19204,896 @@
     <p:extLst>
       <p:ext uri="{BB962C8B-B14F-4D97-AF65-F5344CB8AC3E}">
         <p14:creationId xmlns:p14="http://schemas.microsoft.com/office/powerpoint/2010/main" val="800326130"/>
+      </p:ext>
+    </p:extLst>
+  </p:cSld>
+  <p:clrMapOvr>
+    <a:masterClrMapping/>
+  </p:clrMapOvr>
+  <p:timing>
+    <p:tnLst>
+      <p:par>
+        <p:cTn xmlns:p14="http://schemas.microsoft.com/office/powerpoint/2010/main" id="1" dur="indefinite" restart="never" nodeType="tmRoot"/>
+      </p:par>
+    </p:tnLst>
+  </p:timing>
+</p:sld>
+</file>
+
+<file path=ppt/slides/slide20.xml><?xml version="1.0" encoding="utf-8"?>
+<p:sld xmlns:a="http://schemas.openxmlformats.org/drawingml/2006/main" xmlns:r="http://schemas.openxmlformats.org/officeDocument/2006/relationships" xmlns:p="http://schemas.openxmlformats.org/presentationml/2006/main">
+  <p:cSld>
+    <p:spTree>
+      <p:nvGrpSpPr>
+        <p:cNvPr id="1" name=""/>
+        <p:cNvGrpSpPr/>
+        <p:nvPr/>
+      </p:nvGrpSpPr>
+      <p:grpSpPr>
+        <a:xfrm>
+          <a:off x="0" y="0"/>
+          <a:ext cx="0" cy="0"/>
+          <a:chOff x="0" y="0"/>
+          <a:chExt cx="0" cy="0"/>
+        </a:xfrm>
+      </p:grpSpPr>
+      <p:sp>
+        <p:nvSpPr>
+          <p:cNvPr id="3" name="Content Placeholder 2"/>
+          <p:cNvSpPr>
+            <a:spLocks noGrp="1"/>
+          </p:cNvSpPr>
+          <p:nvPr>
+            <p:ph idx="1"/>
+          </p:nvPr>
+        </p:nvSpPr>
+        <p:spPr/>
+        <p:txBody>
+          <a:bodyPr>
+            <a:normAutofit/>
+          </a:bodyPr>
+          <a:lstStyle/>
+          <a:p>
+            <a:r>
+              <a:rPr lang="en-US" dirty="0" smtClean="0">
+                <a:solidFill>
+                  <a:schemeClr val="tx1"/>
+                </a:solidFill>
+              </a:rPr>
+              <a:t>Example of </a:t>
+            </a:r>
+            <a:r>
+              <a:rPr lang="en-US" dirty="0" err="1" smtClean="0">
+                <a:solidFill>
+                  <a:schemeClr val="tx1"/>
+                </a:solidFill>
+              </a:rPr>
+              <a:t>lexicopgrahic</a:t>
+            </a:r>
+            <a:r>
+              <a:rPr lang="en-US" dirty="0" smtClean="0">
+                <a:solidFill>
+                  <a:schemeClr val="tx1"/>
+                </a:solidFill>
+              </a:rPr>
+              <a:t> (alphabetic) keys:</a:t>
+            </a:r>
+            <a:endParaRPr lang="en-US" dirty="0">
+              <a:solidFill>
+                <a:schemeClr val="tx1"/>
+              </a:solidFill>
+            </a:endParaRPr>
+          </a:p>
+          <a:p>
+            <a:pPr lvl="1"/>
+            <a:r>
+              <a:rPr lang="en-US" dirty="0">
+                <a:solidFill>
+                  <a:schemeClr val="tx1"/>
+                </a:solidFill>
+              </a:rPr>
+              <a:t>s3:/</a:t>
+            </a:r>
+            <a:r>
+              <a:rPr lang="en-US" dirty="0" smtClean="0">
+                <a:solidFill>
+                  <a:schemeClr val="tx1"/>
+                </a:solidFill>
+              </a:rPr>
+              <a:t>/</a:t>
+            </a:r>
+            <a:r>
+              <a:rPr lang="en-US" dirty="0">
+                <a:solidFill>
+                  <a:schemeClr val="tx1"/>
+                </a:solidFill>
+              </a:rPr>
+              <a:t>photos</a:t>
+            </a:r>
+            <a:r>
+              <a:rPr lang="en-US" dirty="0" smtClean="0">
+                <a:solidFill>
+                  <a:schemeClr val="tx1"/>
+                </a:solidFill>
+              </a:rPr>
+              <a:t>/</a:t>
+            </a:r>
+            <a:r>
+              <a:rPr lang="en-US" dirty="0" smtClean="0">
+                <a:solidFill>
+                  <a:srgbClr val="FF0000"/>
+                </a:solidFill>
+              </a:rPr>
+              <a:t>9770527</a:t>
+            </a:r>
+            <a:r>
+              <a:rPr lang="en-US" dirty="0">
+                <a:solidFill>
+                  <a:schemeClr val="tx1"/>
+                </a:solidFill>
+              </a:rPr>
+              <a:t>/volvo_74085.</a:t>
+            </a:r>
+            <a:r>
+              <a:rPr lang="en-US" dirty="0" smtClean="0">
+                <a:solidFill>
+                  <a:schemeClr val="tx1"/>
+                </a:solidFill>
+              </a:rPr>
+              <a:t>jpg</a:t>
+            </a:r>
+          </a:p>
+          <a:p>
+            <a:pPr lvl="1"/>
+            <a:r>
+              <a:rPr lang="en-US" dirty="0" smtClean="0">
+                <a:solidFill>
+                  <a:schemeClr val="tx1"/>
+                </a:solidFill>
+              </a:rPr>
+              <a:t>s3</a:t>
+            </a:r>
+            <a:r>
+              <a:rPr lang="en-US" dirty="0">
+                <a:solidFill>
+                  <a:schemeClr val="tx1"/>
+                </a:solidFill>
+              </a:rPr>
+              <a:t>:/</a:t>
+            </a:r>
+            <a:r>
+              <a:rPr lang="en-US" dirty="0" smtClean="0">
+                <a:solidFill>
+                  <a:schemeClr val="tx1"/>
+                </a:solidFill>
+              </a:rPr>
+              <a:t>/</a:t>
+            </a:r>
+            <a:r>
+              <a:rPr lang="en-US" dirty="0">
+                <a:solidFill>
+                  <a:schemeClr val="tx1"/>
+                </a:solidFill>
+              </a:rPr>
+              <a:t>photos</a:t>
+            </a:r>
+            <a:r>
+              <a:rPr lang="en-US" dirty="0" smtClean="0">
+                <a:solidFill>
+                  <a:schemeClr val="tx1"/>
+                </a:solidFill>
+              </a:rPr>
+              <a:t>/</a:t>
+            </a:r>
+            <a:r>
+              <a:rPr lang="en-US" dirty="0" smtClean="0">
+                <a:solidFill>
+                  <a:srgbClr val="FF0000"/>
+                </a:solidFill>
+              </a:rPr>
+              <a:t>9770527</a:t>
+            </a:r>
+            <a:r>
+              <a:rPr lang="en-US" dirty="0" smtClean="0">
+                <a:solidFill>
+                  <a:schemeClr val="tx1"/>
+                </a:solidFill>
+              </a:rPr>
+              <a:t>/acura_integra02.jpg</a:t>
+            </a:r>
+            <a:endParaRPr lang="en-US" dirty="0">
+              <a:solidFill>
+                <a:schemeClr val="tx1"/>
+              </a:solidFill>
+            </a:endParaRPr>
+          </a:p>
+          <a:p>
+            <a:pPr lvl="1"/>
+            <a:r>
+              <a:rPr lang="en-US" dirty="0">
+                <a:solidFill>
+                  <a:schemeClr val="tx1"/>
+                </a:solidFill>
+              </a:rPr>
+              <a:t>s3:/</a:t>
+            </a:r>
+            <a:r>
+              <a:rPr lang="en-US" dirty="0" smtClean="0">
+                <a:solidFill>
+                  <a:schemeClr val="tx1"/>
+                </a:solidFill>
+              </a:rPr>
+              <a:t>/</a:t>
+            </a:r>
+            <a:r>
+              <a:rPr lang="en-US" dirty="0">
+                <a:solidFill>
+                  <a:schemeClr val="tx1"/>
+                </a:solidFill>
+              </a:rPr>
+              <a:t>photos</a:t>
+            </a:r>
+            <a:r>
+              <a:rPr lang="en-US" dirty="0" smtClean="0">
+                <a:solidFill>
+                  <a:schemeClr val="tx1"/>
+                </a:solidFill>
+              </a:rPr>
+              <a:t>/</a:t>
+            </a:r>
+            <a:r>
+              <a:rPr lang="en-US" dirty="0" smtClean="0">
+                <a:solidFill>
+                  <a:srgbClr val="FF0000"/>
+                </a:solidFill>
+              </a:rPr>
+              <a:t>9770527</a:t>
+            </a:r>
+            <a:r>
+              <a:rPr lang="en-US" dirty="0" smtClean="0">
+                <a:solidFill>
+                  <a:schemeClr val="tx1"/>
+                </a:solidFill>
+              </a:rPr>
+              <a:t>/honda_accord05.jpg</a:t>
+            </a:r>
+          </a:p>
+          <a:p>
+            <a:r>
+              <a:rPr lang="en-US" dirty="0" smtClean="0">
+                <a:solidFill>
+                  <a:schemeClr val="tx1"/>
+                </a:solidFill>
+              </a:rPr>
+              <a:t>Example </a:t>
+            </a:r>
+            <a:r>
+              <a:rPr lang="en-US" dirty="0">
+                <a:solidFill>
+                  <a:schemeClr val="tx1"/>
+                </a:solidFill>
+              </a:rPr>
+              <a:t>of </a:t>
+            </a:r>
+            <a:r>
+              <a:rPr lang="en-US" dirty="0" smtClean="0">
+                <a:solidFill>
+                  <a:schemeClr val="tx1"/>
+                </a:solidFill>
+              </a:rPr>
+              <a:t>hashed </a:t>
+            </a:r>
+            <a:r>
+              <a:rPr lang="en-US" dirty="0">
+                <a:solidFill>
+                  <a:schemeClr val="tx1"/>
+                </a:solidFill>
+              </a:rPr>
+              <a:t>keys:</a:t>
+            </a:r>
+          </a:p>
+          <a:p>
+            <a:pPr lvl="1"/>
+            <a:r>
+              <a:rPr lang="en-US" dirty="0">
+                <a:solidFill>
+                  <a:schemeClr val="tx1"/>
+                </a:solidFill>
+              </a:rPr>
+              <a:t>s3:/</a:t>
+            </a:r>
+            <a:r>
+              <a:rPr lang="en-US" dirty="0" smtClean="0">
+                <a:solidFill>
+                  <a:schemeClr val="tx1"/>
+                </a:solidFill>
+              </a:rPr>
+              <a:t>/</a:t>
+            </a:r>
+            <a:r>
+              <a:rPr lang="en-US" dirty="0">
+                <a:solidFill>
+                  <a:schemeClr val="tx1"/>
+                </a:solidFill>
+              </a:rPr>
+              <a:t>photos</a:t>
+            </a:r>
+            <a:r>
+              <a:rPr lang="en-US" dirty="0" smtClean="0">
+                <a:solidFill>
+                  <a:schemeClr val="tx1"/>
+                </a:solidFill>
+              </a:rPr>
+              <a:t>/</a:t>
+            </a:r>
+            <a:r>
+              <a:rPr lang="en-US" dirty="0" smtClean="0">
+                <a:solidFill>
+                  <a:srgbClr val="008000"/>
+                </a:solidFill>
+              </a:rPr>
+              <a:t>3636a</a:t>
+            </a:r>
+            <a:r>
+              <a:rPr lang="en-US" dirty="0" smtClean="0">
+                <a:solidFill>
+                  <a:schemeClr val="tx1"/>
+                </a:solidFill>
+              </a:rPr>
+              <a:t>/9770527/</a:t>
+            </a:r>
+            <a:r>
+              <a:rPr lang="en-US" dirty="0">
+                <a:solidFill>
+                  <a:schemeClr val="tx1"/>
+                </a:solidFill>
+              </a:rPr>
+              <a:t>acura_integra02.</a:t>
+            </a:r>
+            <a:r>
+              <a:rPr lang="en-US" dirty="0" smtClean="0">
+                <a:solidFill>
+                  <a:schemeClr val="tx1"/>
+                </a:solidFill>
+              </a:rPr>
+              <a:t>jpg</a:t>
+            </a:r>
+          </a:p>
+          <a:p>
+            <a:pPr lvl="1"/>
+            <a:r>
+              <a:rPr lang="en-US" dirty="0">
+                <a:solidFill>
+                  <a:schemeClr val="tx1"/>
+                </a:solidFill>
+              </a:rPr>
+              <a:t>s3://photos/</a:t>
+            </a:r>
+            <a:r>
+              <a:rPr lang="en-US" dirty="0">
+                <a:solidFill>
+                  <a:srgbClr val="008000"/>
+                </a:solidFill>
+              </a:rPr>
+              <a:t>737a</a:t>
+            </a:r>
+            <a:r>
+              <a:rPr lang="en-US" dirty="0">
+                <a:solidFill>
+                  <a:schemeClr val="tx1"/>
+                </a:solidFill>
+              </a:rPr>
+              <a:t>/9770527/honda_accord05.</a:t>
+            </a:r>
+            <a:r>
+              <a:rPr lang="en-US" dirty="0" smtClean="0">
+                <a:solidFill>
+                  <a:schemeClr val="tx1"/>
+                </a:solidFill>
+              </a:rPr>
+              <a:t>jpg</a:t>
+            </a:r>
+          </a:p>
+          <a:p>
+            <a:pPr lvl="1"/>
+            <a:r>
+              <a:rPr lang="en-US" dirty="0" smtClean="0">
+                <a:solidFill>
+                  <a:schemeClr val="tx1"/>
+                </a:solidFill>
+              </a:rPr>
+              <a:t>s3</a:t>
+            </a:r>
+            <a:r>
+              <a:rPr lang="en-US" dirty="0">
+                <a:solidFill>
+                  <a:schemeClr val="tx1"/>
+                </a:solidFill>
+              </a:rPr>
+              <a:t>:/</a:t>
+            </a:r>
+            <a:r>
+              <a:rPr lang="en-US" dirty="0" smtClean="0">
+                <a:solidFill>
+                  <a:schemeClr val="tx1"/>
+                </a:solidFill>
+              </a:rPr>
+              <a:t>/</a:t>
+            </a:r>
+            <a:r>
+              <a:rPr lang="en-US" dirty="0">
+                <a:solidFill>
+                  <a:schemeClr val="tx1"/>
+                </a:solidFill>
+              </a:rPr>
+              <a:t>photos</a:t>
+            </a:r>
+            <a:r>
+              <a:rPr lang="en-US" dirty="0" smtClean="0">
+                <a:solidFill>
+                  <a:schemeClr val="tx1"/>
+                </a:solidFill>
+              </a:rPr>
+              <a:t>/</a:t>
+            </a:r>
+            <a:r>
+              <a:rPr lang="en-US" dirty="0" smtClean="0">
+                <a:solidFill>
+                  <a:srgbClr val="008000"/>
+                </a:solidFill>
+              </a:rPr>
+              <a:t>d66a</a:t>
+            </a:r>
+            <a:r>
+              <a:rPr lang="en-US" dirty="0" smtClean="0">
+                <a:solidFill>
+                  <a:schemeClr val="tx1"/>
+                </a:solidFill>
+              </a:rPr>
+              <a:t>/9770527</a:t>
+            </a:r>
+            <a:r>
+              <a:rPr lang="en-US" dirty="0">
+                <a:solidFill>
+                  <a:schemeClr val="tx1"/>
+                </a:solidFill>
+              </a:rPr>
+              <a:t>/volvo_74085.</a:t>
+            </a:r>
+            <a:r>
+              <a:rPr lang="en-US" dirty="0" smtClean="0">
+                <a:solidFill>
+                  <a:schemeClr val="tx1"/>
+                </a:solidFill>
+              </a:rPr>
+              <a:t>jpg</a:t>
+            </a:r>
+            <a:endParaRPr lang="en-US" dirty="0">
+              <a:solidFill>
+                <a:schemeClr val="tx1"/>
+              </a:solidFill>
+            </a:endParaRPr>
+          </a:p>
+        </p:txBody>
+      </p:sp>
+      <p:sp>
+        <p:nvSpPr>
+          <p:cNvPr id="2" name="Title 1"/>
+          <p:cNvSpPr>
+            <a:spLocks noGrp="1"/>
+          </p:cNvSpPr>
+          <p:nvPr>
+            <p:ph type="title"/>
+          </p:nvPr>
+        </p:nvSpPr>
+        <p:spPr/>
+        <p:txBody>
+          <a:bodyPr/>
+          <a:lstStyle/>
+          <a:p>
+            <a:r>
+              <a:rPr lang="en-US" dirty="0" smtClean="0"/>
+              <a:t>S3: Performance Optimization II</a:t>
+            </a:r>
+            <a:endParaRPr lang="en-US" dirty="0"/>
+          </a:p>
+        </p:txBody>
+      </p:sp>
+    </p:spTree>
+    <p:extLst>
+      <p:ext uri="{BB962C8B-B14F-4D97-AF65-F5344CB8AC3E}">
+        <p14:creationId xmlns:p14="http://schemas.microsoft.com/office/powerpoint/2010/main" val="318922468"/>
+      </p:ext>
+    </p:extLst>
+  </p:cSld>
+  <p:clrMapOvr>
+    <a:masterClrMapping/>
+  </p:clrMapOvr>
+  <p:timing>
+    <p:tnLst>
+      <p:par>
+        <p:cTn xmlns:p14="http://schemas.microsoft.com/office/powerpoint/2010/main" id="1" dur="indefinite" restart="never" nodeType="tmRoot"/>
+      </p:par>
+    </p:tnLst>
+  </p:timing>
+</p:sld>
+</file>
+
+<file path=ppt/slides/slide21.xml><?xml version="1.0" encoding="utf-8"?>
+<p:sld xmlns:a="http://schemas.openxmlformats.org/drawingml/2006/main" xmlns:r="http://schemas.openxmlformats.org/officeDocument/2006/relationships" xmlns:p="http://schemas.openxmlformats.org/presentationml/2006/main">
+  <p:cSld>
+    <p:spTree>
+      <p:nvGrpSpPr>
+        <p:cNvPr id="1" name=""/>
+        <p:cNvGrpSpPr/>
+        <p:nvPr/>
+      </p:nvGrpSpPr>
+      <p:grpSpPr>
+        <a:xfrm>
+          <a:off x="0" y="0"/>
+          <a:ext cx="0" cy="0"/>
+          <a:chOff x="0" y="0"/>
+          <a:chExt cx="0" cy="0"/>
+        </a:xfrm>
+      </p:grpSpPr>
+      <p:sp>
+        <p:nvSpPr>
+          <p:cNvPr id="3" name="Content Placeholder 2"/>
+          <p:cNvSpPr>
+            <a:spLocks noGrp="1"/>
+          </p:cNvSpPr>
+          <p:nvPr>
+            <p:ph idx="1"/>
+          </p:nvPr>
+        </p:nvSpPr>
+        <p:spPr/>
+        <p:txBody>
+          <a:bodyPr>
+            <a:normAutofit/>
+          </a:bodyPr>
+          <a:lstStyle/>
+          <a:p>
+            <a:r>
+              <a:rPr lang="en-US" dirty="0" smtClean="0"/>
+              <a:t>Have Instructions for Configuration</a:t>
+            </a:r>
+          </a:p>
+          <a:p>
+            <a:r>
+              <a:rPr lang="en-US" dirty="0" smtClean="0"/>
+              <a:t>Released on March 24, 2015</a:t>
+            </a:r>
+          </a:p>
+          <a:p>
+            <a:r>
+              <a:rPr lang="en-US" dirty="0" smtClean="0"/>
+              <a:t>Use Cross Region Replication to Automatically push Objects from one Region to Another</a:t>
+            </a:r>
+          </a:p>
+          <a:p>
+            <a:r>
+              <a:rPr lang="en-US" dirty="0" smtClean="0"/>
+              <a:t>Replication includes object ACLs, metadata</a:t>
+            </a:r>
+            <a:r>
+              <a:rPr lang="en-US" dirty="0"/>
+              <a:t> </a:t>
+            </a:r>
+            <a:r>
+              <a:rPr lang="en-US" dirty="0" smtClean="0"/>
+              <a:t>and Reduced Redundancy Storage setting</a:t>
+            </a:r>
+          </a:p>
+        </p:txBody>
+      </p:sp>
+      <p:sp>
+        <p:nvSpPr>
+          <p:cNvPr id="2" name="Title 1"/>
+          <p:cNvSpPr>
+            <a:spLocks noGrp="1"/>
+          </p:cNvSpPr>
+          <p:nvPr>
+            <p:ph type="title"/>
+          </p:nvPr>
+        </p:nvSpPr>
+        <p:spPr/>
+        <p:txBody>
+          <a:bodyPr>
+            <a:normAutofit fontScale="90000"/>
+          </a:bodyPr>
+          <a:lstStyle/>
+          <a:p>
+            <a:r>
+              <a:rPr lang="en-US" dirty="0" smtClean="0"/>
+              <a:t>Hands On: S3 Cross Region Replication</a:t>
+            </a:r>
+            <a:endParaRPr lang="en-US" dirty="0"/>
+          </a:p>
+        </p:txBody>
+      </p:sp>
+      <p:sp>
+        <p:nvSpPr>
+          <p:cNvPr id="4" name="TextBox 3"/>
+          <p:cNvSpPr txBox="1"/>
+          <p:nvPr/>
+        </p:nvSpPr>
+        <p:spPr>
+          <a:xfrm>
+            <a:off x="10678781" y="4679784"/>
+            <a:ext cx="184666" cy="369332"/>
+          </a:xfrm>
+          <a:prstGeom prst="rect">
+            <a:avLst/>
+          </a:prstGeom>
+          <a:noFill/>
+        </p:spPr>
+        <p:txBody>
+          <a:bodyPr wrap="none" rtlCol="0">
+            <a:spAutoFit/>
+          </a:bodyPr>
+          <a:lstStyle/>
+          <a:p>
+            <a:endParaRPr lang="en-US"/>
+          </a:p>
+        </p:txBody>
+      </p:sp>
+    </p:spTree>
+    <p:extLst>
+      <p:ext uri="{BB962C8B-B14F-4D97-AF65-F5344CB8AC3E}">
+        <p14:creationId xmlns:p14="http://schemas.microsoft.com/office/powerpoint/2010/main" val="3642192089"/>
+      </p:ext>
+    </p:extLst>
+  </p:cSld>
+  <p:clrMapOvr>
+    <a:masterClrMapping/>
+  </p:clrMapOvr>
+  <p:timing>
+    <p:tnLst>
+      <p:par>
+        <p:cTn xmlns:p14="http://schemas.microsoft.com/office/powerpoint/2010/main" id="1" dur="indefinite" restart="never" nodeType="tmRoot"/>
+      </p:par>
+    </p:tnLst>
+  </p:timing>
+</p:sld>
+</file>
+
+<file path=ppt/slides/slide22.xml><?xml version="1.0" encoding="utf-8"?>
+<p:sld xmlns:a="http://schemas.openxmlformats.org/drawingml/2006/main" xmlns:r="http://schemas.openxmlformats.org/officeDocument/2006/relationships" xmlns:p="http://schemas.openxmlformats.org/presentationml/2006/main">
+  <p:cSld>
+    <p:spTree>
+      <p:nvGrpSpPr>
+        <p:cNvPr id="1" name=""/>
+        <p:cNvGrpSpPr/>
+        <p:nvPr/>
+      </p:nvGrpSpPr>
+      <p:grpSpPr>
+        <a:xfrm>
+          <a:off x="0" y="0"/>
+          <a:ext cx="0" cy="0"/>
+          <a:chOff x="0" y="0"/>
+          <a:chExt cx="0" cy="0"/>
+        </a:xfrm>
+      </p:grpSpPr>
+      <p:sp>
+        <p:nvSpPr>
+          <p:cNvPr id="3" name="Content Placeholder 2"/>
+          <p:cNvSpPr>
+            <a:spLocks noGrp="1"/>
+          </p:cNvSpPr>
+          <p:nvPr>
+            <p:ph idx="1"/>
+          </p:nvPr>
+        </p:nvSpPr>
+        <p:spPr/>
+        <p:txBody>
+          <a:bodyPr>
+            <a:normAutofit/>
+          </a:bodyPr>
+          <a:lstStyle/>
+          <a:p>
+            <a:r>
+              <a:rPr lang="en-US" dirty="0" smtClean="0"/>
+              <a:t>Create an IAM user that:</a:t>
+            </a:r>
+          </a:p>
+          <a:p>
+            <a:pPr lvl="1"/>
+            <a:r>
+              <a:rPr lang="en-US" dirty="0" smtClean="0"/>
+              <a:t>has the ability to PUT/GET/DELETE objects in a given bucket</a:t>
+            </a:r>
+          </a:p>
+          <a:p>
+            <a:pPr lvl="1"/>
+            <a:r>
+              <a:rPr lang="en-US" dirty="0"/>
+              <a:t>h</a:t>
+            </a:r>
+            <a:r>
+              <a:rPr lang="en-US" dirty="0" smtClean="0"/>
+              <a:t>as no further permissions:</a:t>
+            </a:r>
+          </a:p>
+          <a:p>
+            <a:r>
+              <a:rPr lang="en-US" dirty="0" smtClean="0"/>
+              <a:t>Sample use case (1): ensuring an application can only access a particular S3 bucke</a:t>
+            </a:r>
+            <a:r>
+              <a:rPr lang="en-US" dirty="0" smtClean="0"/>
+              <a:t>t (or S3 bucket / prefix)</a:t>
+            </a:r>
+          </a:p>
+          <a:p>
+            <a:r>
+              <a:rPr lang="en-US" dirty="0" smtClean="0"/>
+              <a:t>Sample use case (2): allowing users to upload or read from only a particular </a:t>
+            </a:r>
+            <a:r>
+              <a:rPr lang="en-US" smtClean="0"/>
+              <a:t>S3 bucket</a:t>
+            </a:r>
+            <a:endParaRPr lang="en-US" dirty="0" smtClean="0"/>
+          </a:p>
+        </p:txBody>
+      </p:sp>
+      <p:sp>
+        <p:nvSpPr>
+          <p:cNvPr id="2" name="Title 1"/>
+          <p:cNvSpPr>
+            <a:spLocks noGrp="1"/>
+          </p:cNvSpPr>
+          <p:nvPr>
+            <p:ph type="title"/>
+          </p:nvPr>
+        </p:nvSpPr>
+        <p:spPr/>
+        <p:txBody>
+          <a:bodyPr>
+            <a:normAutofit/>
+          </a:bodyPr>
+          <a:lstStyle/>
+          <a:p>
+            <a:r>
+              <a:rPr lang="en-US" dirty="0" smtClean="0"/>
+              <a:t>Hands On: S3 IAM Access</a:t>
+            </a:r>
+            <a:endParaRPr lang="en-US" dirty="0"/>
+          </a:p>
+        </p:txBody>
+      </p:sp>
+      <p:sp>
+        <p:nvSpPr>
+          <p:cNvPr id="4" name="TextBox 3"/>
+          <p:cNvSpPr txBox="1"/>
+          <p:nvPr/>
+        </p:nvSpPr>
+        <p:spPr>
+          <a:xfrm>
+            <a:off x="10678781" y="4679784"/>
+            <a:ext cx="184666" cy="369332"/>
+          </a:xfrm>
+          <a:prstGeom prst="rect">
+            <a:avLst/>
+          </a:prstGeom>
+          <a:noFill/>
+        </p:spPr>
+        <p:txBody>
+          <a:bodyPr wrap="none" rtlCol="0">
+            <a:spAutoFit/>
+          </a:bodyPr>
+          <a:lstStyle/>
+          <a:p>
+            <a:endParaRPr lang="en-US"/>
+          </a:p>
+        </p:txBody>
+      </p:sp>
+    </p:spTree>
+    <p:extLst>
+      <p:ext uri="{BB962C8B-B14F-4D97-AF65-F5344CB8AC3E}">
+        <p14:creationId xmlns:p14="http://schemas.microsoft.com/office/powerpoint/2010/main" val="693792319"/>
+      </p:ext>
+    </p:extLst>
+  </p:cSld>
+  <p:clrMapOvr>
+    <a:masterClrMapping/>
+  </p:clrMapOvr>
+  <p:timing>
+    <p:tnLst>
+      <p:par>
+        <p:cTn xmlns:p14="http://schemas.microsoft.com/office/powerpoint/2010/main" id="1" dur="indefinite" restart="never" nodeType="tmRoot"/>
+      </p:par>
+    </p:tnLst>
+  </p:timing>
+</p:sld>
+</file>
+
+<file path=ppt/slides/slide23.xml><?xml version="1.0" encoding="utf-8"?>
+<p:sld xmlns:a="http://schemas.openxmlformats.org/drawingml/2006/main" xmlns:r="http://schemas.openxmlformats.org/officeDocument/2006/relationships" xmlns:p="http://schemas.openxmlformats.org/presentationml/2006/main">
+  <p:cSld>
+    <p:spTree>
+      <p:nvGrpSpPr>
+        <p:cNvPr id="1" name=""/>
+        <p:cNvGrpSpPr/>
+        <p:nvPr/>
+      </p:nvGrpSpPr>
+      <p:grpSpPr>
+        <a:xfrm>
+          <a:off x="0" y="0"/>
+          <a:ext cx="0" cy="0"/>
+          <a:chOff x="0" y="0"/>
+          <a:chExt cx="0" cy="0"/>
+        </a:xfrm>
+      </p:grpSpPr>
+      <p:sp>
+        <p:nvSpPr>
+          <p:cNvPr id="3" name="Content Placeholder 2"/>
+          <p:cNvSpPr>
+            <a:spLocks noGrp="1"/>
+          </p:cNvSpPr>
+          <p:nvPr>
+            <p:ph idx="1"/>
+          </p:nvPr>
+        </p:nvSpPr>
+        <p:spPr/>
+        <p:txBody>
+          <a:bodyPr>
+            <a:normAutofit/>
+          </a:bodyPr>
+          <a:lstStyle/>
+          <a:p>
+            <a:r>
+              <a:rPr lang="en-US" dirty="0" smtClean="0"/>
+              <a:t>Storage of all user and auto photos for a Ride Sharing network</a:t>
+            </a:r>
+          </a:p>
+          <a:p>
+            <a:r>
+              <a:rPr lang="en-US" dirty="0" smtClean="0"/>
+              <a:t>Origin for a CDN used by all company websites</a:t>
+            </a:r>
+          </a:p>
+          <a:p>
+            <a:r>
+              <a:rPr lang="en-US" dirty="0" smtClean="0"/>
+              <a:t>Archival Storage and Backup</a:t>
+            </a:r>
+          </a:p>
+          <a:p>
+            <a:r>
+              <a:rPr lang="en-US" dirty="0" smtClean="0"/>
+              <a:t>Performed analysis where Azure was less expensive due to cost of “PUTS” on AWS being higher than Azure</a:t>
+            </a:r>
+          </a:p>
+        </p:txBody>
+      </p:sp>
+      <p:sp>
+        <p:nvSpPr>
+          <p:cNvPr id="2" name="Title 1"/>
+          <p:cNvSpPr>
+            <a:spLocks noGrp="1"/>
+          </p:cNvSpPr>
+          <p:nvPr>
+            <p:ph type="title"/>
+          </p:nvPr>
+        </p:nvSpPr>
+        <p:spPr/>
+        <p:txBody>
+          <a:bodyPr/>
+          <a:lstStyle/>
+          <a:p>
+            <a:r>
+              <a:rPr lang="en-US" dirty="0" smtClean="0"/>
+              <a:t>S3: Practical Experience</a:t>
+            </a:r>
+            <a:endParaRPr lang="en-US" dirty="0"/>
+          </a:p>
+        </p:txBody>
+      </p:sp>
+    </p:spTree>
+    <p:extLst>
+      <p:ext uri="{BB962C8B-B14F-4D97-AF65-F5344CB8AC3E}">
+        <p14:creationId xmlns:p14="http://schemas.microsoft.com/office/powerpoint/2010/main" val="2648952938"/>
       </p:ext>
     </p:extLst>
   </p:cSld>

</xml_diff>

<commit_message>
aws s3 rename labs
</commit_message>
<xml_diff>
--- a/aws-s3/aws-s3.pptx
+++ b/aws-s3/aws-s3.pptx
@@ -5,7 +5,7 @@
     <p:sldMasterId id="2147483677" r:id="rId1"/>
   </p:sldMasterIdLst>
   <p:notesMasterIdLst>
-    <p:notesMasterId r:id="rId24"/>
+    <p:notesMasterId r:id="rId22"/>
   </p:notesMasterIdLst>
   <p:sldIdLst>
     <p:sldId id="302" r:id="rId2"/>
@@ -27,9 +27,7 @@
     <p:sldId id="303" r:id="rId18"/>
     <p:sldId id="305" r:id="rId19"/>
     <p:sldId id="306" r:id="rId20"/>
-    <p:sldId id="300" r:id="rId21"/>
-    <p:sldId id="304" r:id="rId22"/>
-    <p:sldId id="283" r:id="rId23"/>
+    <p:sldId id="283" r:id="rId21"/>
   </p:sldIdLst>
   <p:sldSz cx="9144000" cy="6858000" type="screen4x3"/>
   <p:notesSz cx="6858000" cy="9144000"/>
@@ -229,7 +227,7 @@
           <a:p>
             <a:fld id="{1B6676A5-1300-B945-98B1-DD92DDC3A3CB}" type="datetimeFigureOut">
               <a:rPr lang="en-US" smtClean="0"/>
-              <a:t>11/22/15</a:t>
+              <a:t>12/1/15</a:t>
             </a:fld>
             <a:endParaRPr lang="en-US"/>
           </a:p>
@@ -1235,11 +1233,7 @@
             </a:r>
             <a:r>
               <a:rPr lang="en-US" dirty="0" smtClean="0"/>
-              <a:t>/amazon-s3-performance-tips-tricks-seattle-hiring-event</a:t>
-            </a:r>
-            <a:r>
-              <a:rPr lang="en-US" dirty="0" smtClean="0"/>
-              <a:t>/</a:t>
+              <a:t>/amazon-s3-performance-tips-tricks-seattle-hiring-event/</a:t>
             </a:r>
           </a:p>
           <a:p>
@@ -1765,7 +1759,11 @@
           <a:p>
             <a:r>
               <a:rPr lang="en-US" dirty="0" smtClean="0"/>
-              <a:t>References:</a:t>
+              <a:t>Cost of</a:t>
+            </a:r>
+            <a:r>
+              <a:rPr lang="en-US" baseline="0" dirty="0" smtClean="0"/>
+              <a:t> PUTS on AWS higher than Azure:</a:t>
             </a:r>
           </a:p>
           <a:p>
@@ -1775,23 +1773,37 @@
             </a:pPr>
             <a:r>
               <a:rPr lang="en-US" dirty="0" smtClean="0"/>
-              <a:t>https://</a:t>
+              <a:t>PUT</a:t>
+            </a:r>
+            <a:r>
+              <a:rPr lang="en-US" baseline="0" dirty="0" smtClean="0"/>
+              <a:t> is $0.005 on AWS: http://</a:t>
+            </a:r>
+            <a:r>
+              <a:rPr lang="en-US" baseline="0" dirty="0" err="1" smtClean="0"/>
+              <a:t>aws.amazon.com</a:t>
+            </a:r>
+            <a:r>
+              <a:rPr lang="en-US" baseline="0" dirty="0" smtClean="0"/>
+              <a:t>/s3/pricing/</a:t>
+            </a:r>
+          </a:p>
+          <a:p>
+            <a:pPr marL="171450" indent="-171450">
+              <a:buFont typeface="Arial"/>
+              <a:buChar char="•"/>
+            </a:pPr>
+            <a:r>
+              <a:rPr lang="en-US" dirty="0" smtClean="0"/>
+              <a:t>All Transactions are $0.0036 on Azure: http://</a:t>
             </a:r>
             <a:r>
               <a:rPr lang="en-US" dirty="0" err="1" smtClean="0"/>
-              <a:t>aws.amazon.com</a:t>
+              <a:t>azure.microsoft.com</a:t>
             </a:r>
             <a:r>
               <a:rPr lang="en-US" dirty="0" smtClean="0"/>
-              <a:t>/blogs/</a:t>
-            </a:r>
-            <a:r>
-              <a:rPr lang="en-US" dirty="0" err="1" smtClean="0"/>
-              <a:t>aws</a:t>
-            </a:r>
-            <a:r>
-              <a:rPr lang="en-US" dirty="0" smtClean="0"/>
-              <a:t>/new-cross-region-replication-for-amazon-s3/</a:t>
+              <a:t>/en-us/pricing/details/storage/</a:t>
             </a:r>
           </a:p>
         </p:txBody>
@@ -1876,62 +1888,35 @@
           <a:bodyPr/>
           <a:lstStyle/>
           <a:p>
-            <a:r>
-              <a:rPr lang="en-US" dirty="0" smtClean="0"/>
-              <a:t>References:</a:t>
-            </a:r>
-          </a:p>
-          <a:p>
             <a:pPr marL="171450" indent="-171450">
-              <a:buFont typeface="Arial"/>
+              <a:buFont typeface="Arial" charset="0"/>
               <a:buChar char="•"/>
             </a:pPr>
             <a:r>
               <a:rPr lang="en-US" dirty="0" smtClean="0"/>
-              <a:t>S3</a:t>
-            </a:r>
-            <a:r>
-              <a:rPr lang="en-US" baseline="0" dirty="0" smtClean="0"/>
-              <a:t> Overview: </a:t>
+              <a:t>Redirects: http://</a:t>
+            </a:r>
+            <a:r>
+              <a:rPr lang="en-US" dirty="0" err="1" smtClean="0"/>
+              <a:t>docs.aws.amazon.com</a:t>
             </a:r>
             <a:r>
               <a:rPr lang="en-US" dirty="0" smtClean="0"/>
-              <a:t>http://</a:t>
+              <a:t>/AmazonS3/latest/</a:t>
             </a:r>
             <a:r>
               <a:rPr lang="en-US" dirty="0" err="1" smtClean="0"/>
-              <a:t>aws.amazon.com</a:t>
+              <a:t>dev</a:t>
             </a:r>
             <a:r>
               <a:rPr lang="en-US" dirty="0" smtClean="0"/>
-              <a:t>/s3/</a:t>
-            </a:r>
-          </a:p>
-          <a:p>
-            <a:pPr marL="171450" indent="-171450">
-              <a:buFont typeface="Arial"/>
-              <a:buChar char="•"/>
-            </a:pPr>
-            <a:r>
-              <a:rPr lang="en-US" dirty="0" smtClean="0"/>
-              <a:t>S3 SLA: http://</a:t>
+              <a:t>/how-to-page-</a:t>
             </a:r>
             <a:r>
               <a:rPr lang="en-US" dirty="0" err="1" smtClean="0"/>
-              <a:t>aws.amazon.com</a:t>
-            </a:r>
-            <a:r>
-              <a:rPr lang="en-US" dirty="0" smtClean="0"/>
-              <a:t>/s3/</a:t>
-            </a:r>
-            <a:r>
-              <a:rPr lang="en-US" dirty="0" err="1" smtClean="0"/>
-              <a:t>sla</a:t>
-            </a:r>
-            <a:r>
-              <a:rPr lang="en-US" dirty="0" smtClean="0"/>
-              <a:t>/</a:t>
-            </a:r>
+              <a:t>redirect.html</a:t>
+            </a:r>
+            <a:endParaRPr lang="en-US" dirty="0" smtClean="0"/>
           </a:p>
         </p:txBody>
       </p:sp>
@@ -1953,250 +1938,6 @@
             <a:fld id="{BFB43062-714D-1146-A97F-0D45BD9E7BF0}" type="slidenum">
               <a:rPr lang="en-US" smtClean="0"/>
               <a:t>3</a:t>
-            </a:fld>
-            <a:endParaRPr lang="en-US"/>
-          </a:p>
-        </p:txBody>
-      </p:sp>
-    </p:spTree>
-    <p:extLst>
-      <p:ext uri="{BB962C8B-B14F-4D97-AF65-F5344CB8AC3E}">
-        <p14:creationId xmlns:p14="http://schemas.microsoft.com/office/powerpoint/2010/main" val="494559740"/>
-      </p:ext>
-    </p:extLst>
-  </p:cSld>
-  <p:clrMapOvr>
-    <a:masterClrMapping/>
-  </p:clrMapOvr>
-</p:notes>
-</file>
-
-<file path=ppt/notesSlides/notesSlide20.xml><?xml version="1.0" encoding="utf-8"?>
-<p:notes xmlns:a="http://schemas.openxmlformats.org/drawingml/2006/main" xmlns:r="http://schemas.openxmlformats.org/officeDocument/2006/relationships" xmlns:p="http://schemas.openxmlformats.org/presentationml/2006/main">
-  <p:cSld>
-    <p:spTree>
-      <p:nvGrpSpPr>
-        <p:cNvPr id="1" name=""/>
-        <p:cNvGrpSpPr/>
-        <p:nvPr/>
-      </p:nvGrpSpPr>
-      <p:grpSpPr>
-        <a:xfrm>
-          <a:off x="0" y="0"/>
-          <a:ext cx="0" cy="0"/>
-          <a:chOff x="0" y="0"/>
-          <a:chExt cx="0" cy="0"/>
-        </a:xfrm>
-      </p:grpSpPr>
-      <p:sp>
-        <p:nvSpPr>
-          <p:cNvPr id="2" name="Slide Image Placeholder 1"/>
-          <p:cNvSpPr>
-            <a:spLocks noGrp="1" noRot="1" noChangeAspect="1"/>
-          </p:cNvSpPr>
-          <p:nvPr>
-            <p:ph type="sldImg"/>
-          </p:nvPr>
-        </p:nvSpPr>
-        <p:spPr/>
-      </p:sp>
-      <p:sp>
-        <p:nvSpPr>
-          <p:cNvPr id="3" name="Notes Placeholder 2"/>
-          <p:cNvSpPr>
-            <a:spLocks noGrp="1"/>
-          </p:cNvSpPr>
-          <p:nvPr>
-            <p:ph type="body" idx="1"/>
-          </p:nvPr>
-        </p:nvSpPr>
-        <p:spPr/>
-        <p:txBody>
-          <a:bodyPr/>
-          <a:lstStyle/>
-          <a:p>
-            <a:r>
-              <a:rPr lang="en-US" dirty="0" smtClean="0"/>
-              <a:t>References:</a:t>
-            </a:r>
-          </a:p>
-          <a:p>
-            <a:pPr marL="171450" indent="-171450">
-              <a:buFont typeface="Arial"/>
-              <a:buChar char="•"/>
-            </a:pPr>
-            <a:r>
-              <a:rPr lang="en-US" dirty="0" smtClean="0"/>
-              <a:t>https://</a:t>
-            </a:r>
-            <a:r>
-              <a:rPr lang="en-US" dirty="0" err="1" smtClean="0"/>
-              <a:t>aws.amazon.com</a:t>
-            </a:r>
-            <a:r>
-              <a:rPr lang="en-US" dirty="0" smtClean="0"/>
-              <a:t>/blogs/</a:t>
-            </a:r>
-            <a:r>
-              <a:rPr lang="en-US" dirty="0" err="1" smtClean="0"/>
-              <a:t>aws</a:t>
-            </a:r>
-            <a:r>
-              <a:rPr lang="en-US" dirty="0" smtClean="0"/>
-              <a:t>/new-cross-region-replication-for-amazon-s3/</a:t>
-            </a:r>
-          </a:p>
-        </p:txBody>
-      </p:sp>
-      <p:sp>
-        <p:nvSpPr>
-          <p:cNvPr id="4" name="Slide Number Placeholder 3"/>
-          <p:cNvSpPr>
-            <a:spLocks noGrp="1"/>
-          </p:cNvSpPr>
-          <p:nvPr>
-            <p:ph type="sldNum" sz="quarter" idx="10"/>
-          </p:nvPr>
-        </p:nvSpPr>
-        <p:spPr/>
-        <p:txBody>
-          <a:bodyPr/>
-          <a:lstStyle/>
-          <a:p>
-            <a:fld id="{BFB43062-714D-1146-A97F-0D45BD9E7BF0}" type="slidenum">
-              <a:rPr lang="en-US" smtClean="0"/>
-              <a:t>21</a:t>
-            </a:fld>
-            <a:endParaRPr lang="en-US"/>
-          </a:p>
-        </p:txBody>
-      </p:sp>
-    </p:spTree>
-    <p:extLst>
-      <p:ext uri="{BB962C8B-B14F-4D97-AF65-F5344CB8AC3E}">
-        <p14:creationId xmlns:p14="http://schemas.microsoft.com/office/powerpoint/2010/main" val="494559740"/>
-      </p:ext>
-    </p:extLst>
-  </p:cSld>
-  <p:clrMapOvr>
-    <a:masterClrMapping/>
-  </p:clrMapOvr>
-</p:notes>
-</file>
-
-<file path=ppt/notesSlides/notesSlide21.xml><?xml version="1.0" encoding="utf-8"?>
-<p:notes xmlns:a="http://schemas.openxmlformats.org/drawingml/2006/main" xmlns:r="http://schemas.openxmlformats.org/officeDocument/2006/relationships" xmlns:p="http://schemas.openxmlformats.org/presentationml/2006/main">
-  <p:cSld>
-    <p:spTree>
-      <p:nvGrpSpPr>
-        <p:cNvPr id="1" name=""/>
-        <p:cNvGrpSpPr/>
-        <p:nvPr/>
-      </p:nvGrpSpPr>
-      <p:grpSpPr>
-        <a:xfrm>
-          <a:off x="0" y="0"/>
-          <a:ext cx="0" cy="0"/>
-          <a:chOff x="0" y="0"/>
-          <a:chExt cx="0" cy="0"/>
-        </a:xfrm>
-      </p:grpSpPr>
-      <p:sp>
-        <p:nvSpPr>
-          <p:cNvPr id="2" name="Slide Image Placeholder 1"/>
-          <p:cNvSpPr>
-            <a:spLocks noGrp="1" noRot="1" noChangeAspect="1"/>
-          </p:cNvSpPr>
-          <p:nvPr>
-            <p:ph type="sldImg"/>
-          </p:nvPr>
-        </p:nvSpPr>
-        <p:spPr/>
-      </p:sp>
-      <p:sp>
-        <p:nvSpPr>
-          <p:cNvPr id="3" name="Notes Placeholder 2"/>
-          <p:cNvSpPr>
-            <a:spLocks noGrp="1"/>
-          </p:cNvSpPr>
-          <p:nvPr>
-            <p:ph type="body" idx="1"/>
-          </p:nvPr>
-        </p:nvSpPr>
-        <p:spPr/>
-        <p:txBody>
-          <a:bodyPr/>
-          <a:lstStyle/>
-          <a:p>
-            <a:r>
-              <a:rPr lang="en-US" dirty="0" smtClean="0"/>
-              <a:t>Cost of</a:t>
-            </a:r>
-            <a:r>
-              <a:rPr lang="en-US" baseline="0" dirty="0" smtClean="0"/>
-              <a:t> PUTS on AWS higher than Azure:</a:t>
-            </a:r>
-          </a:p>
-          <a:p>
-            <a:pPr marL="171450" indent="-171450">
-              <a:buFont typeface="Arial"/>
-              <a:buChar char="•"/>
-            </a:pPr>
-            <a:r>
-              <a:rPr lang="en-US" dirty="0" smtClean="0"/>
-              <a:t>PUT</a:t>
-            </a:r>
-            <a:r>
-              <a:rPr lang="en-US" baseline="0" dirty="0" smtClean="0"/>
-              <a:t> is $0.005 on AWS: http://</a:t>
-            </a:r>
-            <a:r>
-              <a:rPr lang="en-US" baseline="0" dirty="0" err="1" smtClean="0"/>
-              <a:t>aws.amazon.com</a:t>
-            </a:r>
-            <a:r>
-              <a:rPr lang="en-US" baseline="0" dirty="0" smtClean="0"/>
-              <a:t>/s3/pricing/</a:t>
-            </a:r>
-          </a:p>
-          <a:p>
-            <a:pPr marL="171450" indent="-171450">
-              <a:buFont typeface="Arial"/>
-              <a:buChar char="•"/>
-            </a:pPr>
-            <a:r>
-              <a:rPr lang="en-US" dirty="0" smtClean="0"/>
-              <a:t>All Transactions are $0.0036 on Azure: http://</a:t>
-            </a:r>
-            <a:r>
-              <a:rPr lang="en-US" dirty="0" err="1" smtClean="0"/>
-              <a:t>azure.microsoft.com</a:t>
-            </a:r>
-            <a:r>
-              <a:rPr lang="en-US" dirty="0" smtClean="0"/>
-              <a:t>/en-us/pricing/details/storage/</a:t>
-            </a:r>
-          </a:p>
-        </p:txBody>
-      </p:sp>
-      <p:sp>
-        <p:nvSpPr>
-          <p:cNvPr id="4" name="Slide Number Placeholder 3"/>
-          <p:cNvSpPr>
-            <a:spLocks noGrp="1"/>
-          </p:cNvSpPr>
-          <p:nvPr>
-            <p:ph type="sldNum" sz="quarter" idx="10"/>
-          </p:nvPr>
-        </p:nvSpPr>
-        <p:spPr/>
-        <p:txBody>
-          <a:bodyPr/>
-          <a:lstStyle/>
-          <a:p>
-            <a:fld id="{BFB43062-714D-1146-A97F-0D45BD9E7BF0}" type="slidenum">
-              <a:rPr lang="en-US" smtClean="0"/>
-              <a:t>22</a:t>
             </a:fld>
             <a:endParaRPr lang="en-US"/>
           </a:p>
@@ -4789,7 +4530,7 @@
           <a:p>
             <a:fld id="{7CE38E4D-051A-41E1-86A4-E56916468FD0}" type="datetimeFigureOut">
               <a:rPr lang="en-US" smtClean="0"/>
-              <a:t>11/22/15</a:t>
+              <a:t>12/1/15</a:t>
             </a:fld>
             <a:endParaRPr lang="en-US"/>
           </a:p>
@@ -4970,7 +4711,7 @@
           <a:p>
             <a:fld id="{7CE38E4D-051A-41E1-86A4-E56916468FD0}" type="datetimeFigureOut">
               <a:rPr lang="en-US" smtClean="0"/>
-              <a:t>11/22/15</a:t>
+              <a:t>12/1/15</a:t>
             </a:fld>
             <a:endParaRPr lang="en-US"/>
           </a:p>
@@ -5121,7 +4862,7 @@
           <a:p>
             <a:fld id="{7CE38E4D-051A-41E1-86A4-E56916468FD0}" type="datetimeFigureOut">
               <a:rPr lang="en-US" smtClean="0"/>
-              <a:t>11/22/15</a:t>
+              <a:t>12/1/15</a:t>
             </a:fld>
             <a:endParaRPr lang="en-US"/>
           </a:p>
@@ -6947,7 +6688,7 @@
           <a:p>
             <a:fld id="{7CE38E4D-051A-41E1-86A4-E56916468FD0}" type="datetimeFigureOut">
               <a:rPr lang="en-US" smtClean="0"/>
-              <a:t>11/22/15</a:t>
+              <a:t>12/1/15</a:t>
             </a:fld>
             <a:endParaRPr lang="en-US"/>
           </a:p>
@@ -8817,7 +8558,7 @@
           <a:p>
             <a:fld id="{7CE38E4D-051A-41E1-86A4-E56916468FD0}" type="datetimeFigureOut">
               <a:rPr lang="en-US" smtClean="0"/>
-              <a:t>11/22/15</a:t>
+              <a:t>12/1/15</a:t>
             </a:fld>
             <a:endParaRPr lang="en-US"/>
           </a:p>
@@ -8930,7 +8671,7 @@
           <a:p>
             <a:fld id="{7CE38E4D-051A-41E1-86A4-E56916468FD0}" type="datetimeFigureOut">
               <a:rPr lang="en-US" smtClean="0"/>
-              <a:t>11/22/15</a:t>
+              <a:t>12/1/15</a:t>
             </a:fld>
             <a:endParaRPr lang="en-US"/>
           </a:p>
@@ -9471,7 +9212,7 @@
           <a:p>
             <a:fld id="{7CE38E4D-051A-41E1-86A4-E56916468FD0}" type="datetimeFigureOut">
               <a:rPr lang="en-US" smtClean="0"/>
-              <a:t>11/22/15</a:t>
+              <a:t>12/1/15</a:t>
             </a:fld>
             <a:endParaRPr lang="en-US"/>
           </a:p>
@@ -9584,7 +9325,7 @@
           <a:p>
             <a:fld id="{7CE38E4D-051A-41E1-86A4-E56916468FD0}" type="datetimeFigureOut">
               <a:rPr lang="en-US" smtClean="0"/>
-              <a:t>11/22/15</a:t>
+              <a:t>12/1/15</a:t>
             </a:fld>
             <a:endParaRPr lang="en-US"/>
           </a:p>
@@ -11295,7 +11036,7 @@
           <a:p>
             <a:fld id="{7CE38E4D-051A-41E1-86A4-E56916468FD0}" type="datetimeFigureOut">
               <a:rPr lang="en-US" smtClean="0"/>
-              <a:t>11/22/15</a:t>
+              <a:t>12/1/15</a:t>
             </a:fld>
             <a:endParaRPr lang="en-US"/>
           </a:p>
@@ -11446,7 +11187,7 @@
           <a:p>
             <a:fld id="{7CE38E4D-051A-41E1-86A4-E56916468FD0}" type="datetimeFigureOut">
               <a:rPr lang="en-US" smtClean="0"/>
-              <a:t>11/22/15</a:t>
+              <a:t>12/1/15</a:t>
             </a:fld>
             <a:endParaRPr lang="en-US"/>
           </a:p>
@@ -15061,7 +14802,7 @@
           <a:p>
             <a:fld id="{7CE38E4D-051A-41E1-86A4-E56916468FD0}" type="datetimeFigureOut">
               <a:rPr lang="en-US" smtClean="0"/>
-              <a:t>11/22/15</a:t>
+              <a:t>12/1/15</a:t>
             </a:fld>
             <a:endParaRPr lang="en-US"/>
           </a:p>
@@ -16920,7 +16661,7 @@
           <a:p>
             <a:fld id="{7CE38E4D-051A-41E1-86A4-E56916468FD0}" type="datetimeFigureOut">
               <a:rPr lang="en-US" smtClean="0"/>
-              <a:t>11/22/15</a:t>
+              <a:t>12/1/15</a:t>
             </a:fld>
             <a:endParaRPr lang="en-US"/>
           </a:p>
@@ -18325,11 +18066,6 @@
               </a:rPr>
               <a:t>Soft-limit of 100 Buckets</a:t>
             </a:r>
-            <a:endParaRPr lang="en-US" dirty="0" smtClean="0">
-              <a:solidFill>
-                <a:schemeClr val="tx1"/>
-              </a:solidFill>
-            </a:endParaRPr>
           </a:p>
           <a:p>
             <a:endParaRPr lang="en-US" dirty="0" smtClean="0">
@@ -18588,12 +18324,14 @@
         </p:nvSpPr>
         <p:spPr/>
         <p:txBody>
-          <a:bodyPr/>
+          <a:bodyPr>
+            <a:normAutofit fontScale="90000"/>
+          </a:bodyPr>
           <a:lstStyle/>
           <a:p>
             <a:r>
               <a:rPr lang="en-US" dirty="0" smtClean="0"/>
-              <a:t>S3: Performance Optimization I</a:t>
+              <a:t>S3: Key Selection and Performance</a:t>
             </a:r>
             <a:endParaRPr lang="en-US" dirty="0"/>
           </a:p>
@@ -18807,12 +18545,18 @@
         </p:nvSpPr>
         <p:spPr/>
         <p:txBody>
-          <a:bodyPr/>
+          <a:bodyPr>
+            <a:normAutofit fontScale="90000"/>
+          </a:bodyPr>
           <a:lstStyle/>
           <a:p>
             <a:r>
+              <a:rPr lang="en-US" dirty="0"/>
+              <a:t>S3: Key </a:t>
+            </a:r>
+            <a:r>
               <a:rPr lang="en-US" dirty="0" smtClean="0"/>
-              <a:t>S3: Performance Optimization II</a:t>
+              <a:t>Selection Problem and Solution</a:t>
             </a:r>
             <a:endParaRPr lang="en-US" dirty="0"/>
           </a:p>
@@ -19311,7 +19055,11 @@
           <a:p>
             <a:r>
               <a:rPr lang="en-US" dirty="0" smtClean="0"/>
-              <a:t>S3: Performance Optimization II</a:t>
+              <a:t>S3: </a:t>
+            </a:r>
+            <a:r>
+              <a:rPr lang="en-US" smtClean="0"/>
+              <a:t>Key Selection Described</a:t>
             </a:r>
             <a:endParaRPr lang="en-US" dirty="0"/>
           </a:p>
@@ -19379,7 +19127,14 @@
           <a:p>
             <a:r>
               <a:rPr lang="en-US" dirty="0" smtClean="0"/>
-              <a:t>Unlimited in Capacity</a:t>
+              <a:t>Unlimited in Number of Objects and Total Storage</a:t>
+            </a:r>
+          </a:p>
+          <a:p>
+            <a:pPr lvl="1"/>
+            <a:r>
+              <a:rPr lang="en-US" dirty="0" smtClean="0"/>
+              <a:t>5 terabyte limit on object size</a:t>
             </a:r>
             <a:endParaRPr lang="en-US" dirty="0"/>
           </a:p>
@@ -19400,14 +19155,38 @@
           <a:p>
             <a:r>
               <a:rPr lang="en-US" dirty="0" smtClean="0"/>
-              <a:t>99.99% Available</a:t>
+              <a:t>99.99% Availability of Objects</a:t>
             </a:r>
           </a:p>
           <a:p>
             <a:r>
               <a:rPr lang="en-US" dirty="0" smtClean="0"/>
-              <a:t>99.9% uptime, per SLA</a:t>
-            </a:r>
+              <a:t>Varying service credits if less than 99.9% Uptime</a:t>
+            </a:r>
+          </a:p>
+          <a:p>
+            <a:pPr lvl="1"/>
+            <a:r>
+              <a:rPr lang="en-US" dirty="0"/>
+              <a:t>Uptime is defined at http://</a:t>
+            </a:r>
+            <a:r>
+              <a:rPr lang="en-US" dirty="0" err="1"/>
+              <a:t>aws.amazon.com</a:t>
+            </a:r>
+            <a:r>
+              <a:rPr lang="en-US" dirty="0"/>
+              <a:t>/s3/</a:t>
+            </a:r>
+            <a:r>
+              <a:rPr lang="en-US" dirty="0" err="1"/>
+              <a:t>sla</a:t>
+            </a:r>
+            <a:r>
+              <a:rPr lang="en-US" dirty="0"/>
+              <a:t>/</a:t>
+            </a:r>
+            <a:endParaRPr lang="en-US" dirty="0" smtClean="0"/>
           </a:p>
         </p:txBody>
       </p:sp>
@@ -19490,291 +19269,6 @@
           <a:p>
             <a:r>
               <a:rPr lang="en-US" dirty="0" smtClean="0"/>
-              <a:t>Have Instructions for Configuration</a:t>
-            </a:r>
-          </a:p>
-          <a:p>
-            <a:r>
-              <a:rPr lang="en-US" dirty="0" smtClean="0"/>
-              <a:t>Released on March 24, 2015</a:t>
-            </a:r>
-          </a:p>
-          <a:p>
-            <a:r>
-              <a:rPr lang="en-US" dirty="0" smtClean="0"/>
-              <a:t>Use Cross Region Replication to Automatically push Objects from one Region to Another</a:t>
-            </a:r>
-          </a:p>
-          <a:p>
-            <a:r>
-              <a:rPr lang="en-US" dirty="0" smtClean="0"/>
-              <a:t>Replication includes object ACLs, metadata</a:t>
-            </a:r>
-            <a:r>
-              <a:rPr lang="en-US" dirty="0"/>
-              <a:t> </a:t>
-            </a:r>
-            <a:r>
-              <a:rPr lang="en-US" dirty="0" smtClean="0"/>
-              <a:t>and Reduced Redundancy Storage setting</a:t>
-            </a:r>
-          </a:p>
-        </p:txBody>
-      </p:sp>
-      <p:sp>
-        <p:nvSpPr>
-          <p:cNvPr id="2" name="Title 1"/>
-          <p:cNvSpPr>
-            <a:spLocks noGrp="1"/>
-          </p:cNvSpPr>
-          <p:nvPr>
-            <p:ph type="title"/>
-          </p:nvPr>
-        </p:nvSpPr>
-        <p:spPr/>
-        <p:txBody>
-          <a:bodyPr>
-            <a:normAutofit fontScale="90000"/>
-          </a:bodyPr>
-          <a:lstStyle/>
-          <a:p>
-            <a:r>
-              <a:rPr lang="en-US" dirty="0" smtClean="0"/>
-              <a:t>Hands On: S3 Cross Region Replication</a:t>
-            </a:r>
-            <a:endParaRPr lang="en-US" dirty="0"/>
-          </a:p>
-        </p:txBody>
-      </p:sp>
-      <p:sp>
-        <p:nvSpPr>
-          <p:cNvPr id="4" name="TextBox 3"/>
-          <p:cNvSpPr txBox="1"/>
-          <p:nvPr/>
-        </p:nvSpPr>
-        <p:spPr>
-          <a:xfrm>
-            <a:off x="10678781" y="4679784"/>
-            <a:ext cx="184666" cy="369332"/>
-          </a:xfrm>
-          <a:prstGeom prst="rect">
-            <a:avLst/>
-          </a:prstGeom>
-          <a:noFill/>
-        </p:spPr>
-        <p:txBody>
-          <a:bodyPr wrap="none" rtlCol="0">
-            <a:spAutoFit/>
-          </a:bodyPr>
-          <a:lstStyle/>
-          <a:p>
-            <a:endParaRPr lang="en-US"/>
-          </a:p>
-        </p:txBody>
-      </p:sp>
-    </p:spTree>
-    <p:extLst>
-      <p:ext uri="{BB962C8B-B14F-4D97-AF65-F5344CB8AC3E}">
-        <p14:creationId xmlns:p14="http://schemas.microsoft.com/office/powerpoint/2010/main" val="3642192089"/>
-      </p:ext>
-    </p:extLst>
-  </p:cSld>
-  <p:clrMapOvr>
-    <a:masterClrMapping/>
-  </p:clrMapOvr>
-  <p:timing>
-    <p:tnLst>
-      <p:par>
-        <p:cTn id="1" dur="indefinite" restart="never" nodeType="tmRoot"/>
-      </p:par>
-    </p:tnLst>
-  </p:timing>
-</p:sld>
-</file>
-
-<file path=ppt/slides/slide21.xml><?xml version="1.0" encoding="utf-8"?>
-<p:sld xmlns:a="http://schemas.openxmlformats.org/drawingml/2006/main" xmlns:r="http://schemas.openxmlformats.org/officeDocument/2006/relationships" xmlns:p="http://schemas.openxmlformats.org/presentationml/2006/main">
-  <p:cSld>
-    <p:spTree>
-      <p:nvGrpSpPr>
-        <p:cNvPr id="1" name=""/>
-        <p:cNvGrpSpPr/>
-        <p:nvPr/>
-      </p:nvGrpSpPr>
-      <p:grpSpPr>
-        <a:xfrm>
-          <a:off x="0" y="0"/>
-          <a:ext cx="0" cy="0"/>
-          <a:chOff x="0" y="0"/>
-          <a:chExt cx="0" cy="0"/>
-        </a:xfrm>
-      </p:grpSpPr>
-      <p:sp>
-        <p:nvSpPr>
-          <p:cNvPr id="3" name="Content Placeholder 2"/>
-          <p:cNvSpPr>
-            <a:spLocks noGrp="1"/>
-          </p:cNvSpPr>
-          <p:nvPr>
-            <p:ph idx="1"/>
-          </p:nvPr>
-        </p:nvSpPr>
-        <p:spPr/>
-        <p:txBody>
-          <a:bodyPr>
-            <a:normAutofit/>
-          </a:bodyPr>
-          <a:lstStyle/>
-          <a:p>
-            <a:r>
-              <a:rPr lang="en-US" dirty="0" smtClean="0"/>
-              <a:t>Create an IAM user that:</a:t>
-            </a:r>
-          </a:p>
-          <a:p>
-            <a:pPr lvl="1"/>
-            <a:r>
-              <a:rPr lang="en-US" dirty="0" smtClean="0"/>
-              <a:t>has the ability to PUT/GET/DELETE objects in a given bucket</a:t>
-            </a:r>
-          </a:p>
-          <a:p>
-            <a:pPr lvl="1"/>
-            <a:r>
-              <a:rPr lang="en-US" dirty="0"/>
-              <a:t>h</a:t>
-            </a:r>
-            <a:r>
-              <a:rPr lang="en-US" dirty="0" smtClean="0"/>
-              <a:t>as no further permissions:</a:t>
-            </a:r>
-          </a:p>
-          <a:p>
-            <a:r>
-              <a:rPr lang="en-US" dirty="0" smtClean="0"/>
-              <a:t>Sample use case (1): ensuring an application can only access a particular S3 bucket (or S3 bucket / prefix)</a:t>
-            </a:r>
-          </a:p>
-          <a:p>
-            <a:r>
-              <a:rPr lang="en-US" dirty="0" smtClean="0"/>
-              <a:t>Sample use case (2): allowing users to upload or read from only a particular </a:t>
-            </a:r>
-            <a:r>
-              <a:rPr lang="en-US" smtClean="0"/>
-              <a:t>S3 bucket</a:t>
-            </a:r>
-            <a:endParaRPr lang="en-US" dirty="0" smtClean="0"/>
-          </a:p>
-        </p:txBody>
-      </p:sp>
-      <p:sp>
-        <p:nvSpPr>
-          <p:cNvPr id="2" name="Title 1"/>
-          <p:cNvSpPr>
-            <a:spLocks noGrp="1"/>
-          </p:cNvSpPr>
-          <p:nvPr>
-            <p:ph type="title"/>
-          </p:nvPr>
-        </p:nvSpPr>
-        <p:spPr/>
-        <p:txBody>
-          <a:bodyPr>
-            <a:normAutofit/>
-          </a:bodyPr>
-          <a:lstStyle/>
-          <a:p>
-            <a:r>
-              <a:rPr lang="en-US" dirty="0" smtClean="0"/>
-              <a:t>Hands On: S3 IAM Access</a:t>
-            </a:r>
-            <a:endParaRPr lang="en-US" dirty="0"/>
-          </a:p>
-        </p:txBody>
-      </p:sp>
-      <p:sp>
-        <p:nvSpPr>
-          <p:cNvPr id="4" name="TextBox 3"/>
-          <p:cNvSpPr txBox="1"/>
-          <p:nvPr/>
-        </p:nvSpPr>
-        <p:spPr>
-          <a:xfrm>
-            <a:off x="10678781" y="4679784"/>
-            <a:ext cx="184666" cy="369332"/>
-          </a:xfrm>
-          <a:prstGeom prst="rect">
-            <a:avLst/>
-          </a:prstGeom>
-          <a:noFill/>
-        </p:spPr>
-        <p:txBody>
-          <a:bodyPr wrap="none" rtlCol="0">
-            <a:spAutoFit/>
-          </a:bodyPr>
-          <a:lstStyle/>
-          <a:p>
-            <a:endParaRPr lang="en-US"/>
-          </a:p>
-        </p:txBody>
-      </p:sp>
-    </p:spTree>
-    <p:extLst>
-      <p:ext uri="{BB962C8B-B14F-4D97-AF65-F5344CB8AC3E}">
-        <p14:creationId xmlns:p14="http://schemas.microsoft.com/office/powerpoint/2010/main" val="693792319"/>
-      </p:ext>
-    </p:extLst>
-  </p:cSld>
-  <p:clrMapOvr>
-    <a:masterClrMapping/>
-  </p:clrMapOvr>
-  <p:timing>
-    <p:tnLst>
-      <p:par>
-        <p:cTn id="1" dur="indefinite" restart="never" nodeType="tmRoot"/>
-      </p:par>
-    </p:tnLst>
-  </p:timing>
-</p:sld>
-</file>
-
-<file path=ppt/slides/slide22.xml><?xml version="1.0" encoding="utf-8"?>
-<p:sld xmlns:a="http://schemas.openxmlformats.org/drawingml/2006/main" xmlns:r="http://schemas.openxmlformats.org/officeDocument/2006/relationships" xmlns:p="http://schemas.openxmlformats.org/presentationml/2006/main">
-  <p:cSld>
-    <p:spTree>
-      <p:nvGrpSpPr>
-        <p:cNvPr id="1" name=""/>
-        <p:cNvGrpSpPr/>
-        <p:nvPr/>
-      </p:nvGrpSpPr>
-      <p:grpSpPr>
-        <a:xfrm>
-          <a:off x="0" y="0"/>
-          <a:ext cx="0" cy="0"/>
-          <a:chOff x="0" y="0"/>
-          <a:chExt cx="0" cy="0"/>
-        </a:xfrm>
-      </p:grpSpPr>
-      <p:sp>
-        <p:nvSpPr>
-          <p:cNvPr id="3" name="Content Placeholder 2"/>
-          <p:cNvSpPr>
-            <a:spLocks noGrp="1"/>
-          </p:cNvSpPr>
-          <p:nvPr>
-            <p:ph idx="1"/>
-          </p:nvPr>
-        </p:nvSpPr>
-        <p:spPr/>
-        <p:txBody>
-          <a:bodyPr>
-            <a:normAutofit/>
-          </a:bodyPr>
-          <a:lstStyle/>
-          <a:p>
-            <a:r>
-              <a:rPr lang="en-US" dirty="0" smtClean="0"/>
               <a:t>Storage of all user and auto photos for a Ride Sharing network</a:t>
             </a:r>
           </a:p>
@@ -19871,7 +19365,7 @@
         <p:spPr/>
         <p:txBody>
           <a:bodyPr>
-            <a:normAutofit lnSpcReduction="10000"/>
+            <a:normAutofit fontScale="92500" lnSpcReduction="10000"/>
           </a:bodyPr>
           <a:lstStyle/>
           <a:p>
@@ -19915,13 +19409,19 @@
             <a:pPr lvl="1"/>
             <a:r>
               <a:rPr lang="en-US" dirty="0" smtClean="0"/>
-              <a:t>Redirects</a:t>
+              <a:t>Redirects (301 Redirect)</a:t>
             </a:r>
           </a:p>
           <a:p>
             <a:r>
               <a:rPr lang="en-US" dirty="0" smtClean="0"/>
-              <a:t>SSL Access</a:t>
+              <a:t>Supports Encryption of Objects in Transit (SSL)</a:t>
+            </a:r>
+          </a:p>
+          <a:p>
+            <a:r>
+              <a:rPr lang="en-US" dirty="0" smtClean="0"/>
+              <a:t>Supports Encryption of Objects at Rest</a:t>
             </a:r>
           </a:p>
         </p:txBody>
@@ -20147,11 +19647,7 @@
             </a:pPr>
             <a:r>
               <a:rPr lang="en-US" dirty="0" smtClean="0"/>
-              <a:t>The following is true for All Regions</a:t>
-            </a:r>
-            <a:r>
-              <a:rPr lang="en-US" dirty="0" smtClean="0"/>
-              <a:t>:</a:t>
+              <a:t>The following is true for All Regions:</a:t>
             </a:r>
           </a:p>
           <a:p>
@@ -20194,11 +19690,7 @@
           <a:p>
             <a:r>
               <a:rPr lang="en-US" dirty="0" smtClean="0"/>
-              <a:t>Replace </a:t>
-            </a:r>
-            <a:r>
-              <a:rPr lang="en-US" dirty="0" smtClean="0"/>
-              <a:t>Object, Read Object – may result in read of previous object’s data</a:t>
+              <a:t>Replace Object, Read Object – may result in read of previous object’s data</a:t>
             </a:r>
           </a:p>
           <a:p>
@@ -20345,6 +19837,14 @@
           <a:p>
             <a:pPr lvl="1"/>
             <a:r>
+              <a:rPr lang="en-US" dirty="0" smtClean="0"/>
+              <a:t>Provided by IAM</a:t>
+            </a:r>
+            <a:endParaRPr lang="en-US" i="1" dirty="0" smtClean="0"/>
+          </a:p>
+          <a:p>
+            <a:pPr lvl="1"/>
+            <a:r>
               <a:rPr lang="en-US" i="1" dirty="0" smtClean="0"/>
               <a:t>Rights that </a:t>
             </a:r>
@@ -20357,13 +19857,6 @@
               <a:t>applied to a User or Group Resource</a:t>
             </a:r>
             <a:endParaRPr lang="en-US" dirty="0" smtClean="0"/>
-          </a:p>
-          <a:p>
-            <a:pPr lvl="1"/>
-            <a:r>
-              <a:rPr lang="en-US" dirty="0" smtClean="0"/>
-              <a:t>IAM</a:t>
-            </a:r>
           </a:p>
           <a:p>
             <a:r>

</xml_diff>